<commit_message>
Production 1: add quiz, references, brush up format, pdf
</commit_message>
<xml_diff>
--- a/docs/part_1/production_1.pptx
+++ b/docs/part_1/production_1.pptx
@@ -5,7 +5,7 @@
     <p:sldMasterId id="2147484296" r:id="rId1"/>
   </p:sldMasterIdLst>
   <p:notesMasterIdLst>
-    <p:notesMasterId r:id="rId29"/>
+    <p:notesMasterId r:id="rId32"/>
   </p:notesMasterIdLst>
   <p:sldIdLst>
     <p:sldId id="256" r:id="rId2"/>
@@ -35,6 +35,9 @@
     <p:sldId id="280" r:id="rId26"/>
     <p:sldId id="281" r:id="rId27"/>
     <p:sldId id="282" r:id="rId28"/>
+    <p:sldId id="283" r:id="rId29"/>
+    <p:sldId id="284" r:id="rId30"/>
+    <p:sldId id="285" r:id="rId31"/>
   </p:sldIdLst>
   <p:sldSz cx="12192000" cy="6858000"/>
   <p:notesSz cx="6858000" cy="9144000"/>
@@ -221,9 +224,9 @@
             </a:lvl1pPr>
           </a:lstStyle>
           <a:p>
-            <a:fld id="{A6C9D088-CBEB-45E0-A686-66BA8F82DFD5}" type="datetimeFigureOut">
+            <a:fld id="{EF481568-D88E-478B-8C6B-D653D3903B0A}" type="datetimeFigureOut">
               <a:rPr lang="en-CA" smtClean="0"/>
-              <a:t>2024-02-09</a:t>
+              <a:t>2024-02-19</a:t>
             </a:fld>
             <a:endParaRPr lang="en-CA"/>
           </a:p>
@@ -380,7 +383,7 @@
             </a:lvl1pPr>
           </a:lstStyle>
           <a:p>
-            <a:fld id="{E9BAD016-3E18-41E0-9557-DC11B3F6176F}" type="slidenum">
+            <a:fld id="{240B5373-8B14-4179-9446-A2C698E4520C}" type="slidenum">
               <a:rPr lang="en-CA" smtClean="0"/>
               <a:t>‹#›</a:t>
             </a:fld>
@@ -391,7 +394,7 @@
     </p:spTree>
     <p:extLst>
       <p:ext uri="{BB962C8B-B14F-4D97-AF65-F5344CB8AC3E}">
-        <p14:creationId xmlns:p14="http://schemas.microsoft.com/office/powerpoint/2010/main" val="1639043987"/>
+        <p14:creationId xmlns:p14="http://schemas.microsoft.com/office/powerpoint/2010/main" val="2547194939"/>
       </p:ext>
     </p:extLst>
   </p:cSld>
@@ -688,10 +691,9 @@
           </a:lstStyle>
           <a:p>
             <a:r>
-              <a:rPr lang="en-US"/>
+              <a:rPr lang="en-CA"/>
               <a:t>February 2024</a:t>
             </a:r>
-            <a:endParaRPr lang="en-CA"/>
           </a:p>
         </p:txBody>
       </p:sp>
@@ -722,7 +724,7 @@
           <a:p>
             <a:r>
               <a:rPr lang="en-US"/>
-              <a:t>Production 1 - Introduction to ML Systems</a:t>
+              <a:t>Production 1: Introduction to ML Systems</a:t>
             </a:r>
             <a:endParaRPr lang="en-CA"/>
           </a:p>
@@ -882,31 +884,30 @@
           <a:lstStyle/>
           <a:p>
             <a:r>
+              <a:rPr lang="en-CA"/>
+              <a:t>February 2024</a:t>
+            </a:r>
+          </a:p>
+        </p:txBody>
+      </p:sp>
+      <p:sp>
+        <p:nvSpPr>
+          <p:cNvPr id="5" name="Footer Placeholder 4"/>
+          <p:cNvSpPr>
+            <a:spLocks noGrp="1"/>
+          </p:cNvSpPr>
+          <p:nvPr>
+            <p:ph type="ftr" sz="quarter" idx="11"/>
+          </p:nvPr>
+        </p:nvSpPr>
+        <p:spPr/>
+        <p:txBody>
+          <a:bodyPr/>
+          <a:lstStyle/>
+          <a:p>
+            <a:r>
               <a:rPr lang="en-US"/>
-              <a:t>February 2024</a:t>
-            </a:r>
-            <a:endParaRPr lang="en-CA"/>
-          </a:p>
-        </p:txBody>
-      </p:sp>
-      <p:sp>
-        <p:nvSpPr>
-          <p:cNvPr id="5" name="Footer Placeholder 4"/>
-          <p:cNvSpPr>
-            <a:spLocks noGrp="1"/>
-          </p:cNvSpPr>
-          <p:nvPr>
-            <p:ph type="ftr" sz="quarter" idx="11"/>
-          </p:nvPr>
-        </p:nvSpPr>
-        <p:spPr/>
-        <p:txBody>
-          <a:bodyPr/>
-          <a:lstStyle/>
-          <a:p>
-            <a:r>
-              <a:rPr lang="en-US"/>
-              <a:t>Production 1 - Introduction to ML Systems</a:t>
+              <a:t>Production 1: Introduction to ML Systems</a:t>
             </a:r>
             <a:endParaRPr lang="en-CA"/>
           </a:p>
@@ -1066,31 +1067,30 @@
           <a:lstStyle/>
           <a:p>
             <a:r>
+              <a:rPr lang="en-CA"/>
+              <a:t>February 2024</a:t>
+            </a:r>
+          </a:p>
+        </p:txBody>
+      </p:sp>
+      <p:sp>
+        <p:nvSpPr>
+          <p:cNvPr id="5" name="Footer Placeholder 4"/>
+          <p:cNvSpPr>
+            <a:spLocks noGrp="1"/>
+          </p:cNvSpPr>
+          <p:nvPr>
+            <p:ph type="ftr" sz="quarter" idx="11"/>
+          </p:nvPr>
+        </p:nvSpPr>
+        <p:spPr/>
+        <p:txBody>
+          <a:bodyPr/>
+          <a:lstStyle/>
+          <a:p>
+            <a:r>
               <a:rPr lang="en-US"/>
-              <a:t>February 2024</a:t>
-            </a:r>
-            <a:endParaRPr lang="en-CA"/>
-          </a:p>
-        </p:txBody>
-      </p:sp>
-      <p:sp>
-        <p:nvSpPr>
-          <p:cNvPr id="5" name="Footer Placeholder 4"/>
-          <p:cNvSpPr>
-            <a:spLocks noGrp="1"/>
-          </p:cNvSpPr>
-          <p:nvPr>
-            <p:ph type="ftr" sz="quarter" idx="11"/>
-          </p:nvPr>
-        </p:nvSpPr>
-        <p:spPr/>
-        <p:txBody>
-          <a:bodyPr/>
-          <a:lstStyle/>
-          <a:p>
-            <a:r>
-              <a:rPr lang="en-US"/>
-              <a:t>Production 1 - Introduction to ML Systems</a:t>
+              <a:t>Production 1: Introduction to ML Systems</a:t>
             </a:r>
             <a:endParaRPr lang="en-CA"/>
           </a:p>
@@ -1240,31 +1240,30 @@
           <a:lstStyle/>
           <a:p>
             <a:r>
+              <a:rPr lang="en-CA"/>
+              <a:t>February 2024</a:t>
+            </a:r>
+          </a:p>
+        </p:txBody>
+      </p:sp>
+      <p:sp>
+        <p:nvSpPr>
+          <p:cNvPr id="5" name="Footer Placeholder 4"/>
+          <p:cNvSpPr>
+            <a:spLocks noGrp="1"/>
+          </p:cNvSpPr>
+          <p:nvPr>
+            <p:ph type="ftr" sz="quarter" idx="11"/>
+          </p:nvPr>
+        </p:nvSpPr>
+        <p:spPr/>
+        <p:txBody>
+          <a:bodyPr/>
+          <a:lstStyle/>
+          <a:p>
+            <a:r>
               <a:rPr lang="en-US"/>
-              <a:t>February 2024</a:t>
-            </a:r>
-            <a:endParaRPr lang="en-CA"/>
-          </a:p>
-        </p:txBody>
-      </p:sp>
-      <p:sp>
-        <p:nvSpPr>
-          <p:cNvPr id="5" name="Footer Placeholder 4"/>
-          <p:cNvSpPr>
-            <a:spLocks noGrp="1"/>
-          </p:cNvSpPr>
-          <p:nvPr>
-            <p:ph type="ftr" sz="quarter" idx="11"/>
-          </p:nvPr>
-        </p:nvSpPr>
-        <p:spPr/>
-        <p:txBody>
-          <a:bodyPr/>
-          <a:lstStyle/>
-          <a:p>
-            <a:r>
-              <a:rPr lang="en-US"/>
-              <a:t>Production 1 - Introduction to ML Systems</a:t>
+              <a:t>Production 1: Introduction to ML Systems</a:t>
             </a:r>
             <a:endParaRPr lang="en-CA"/>
           </a:p>
@@ -1500,31 +1499,30 @@
           <a:lstStyle/>
           <a:p>
             <a:r>
+              <a:rPr lang="en-CA"/>
+              <a:t>February 2024</a:t>
+            </a:r>
+          </a:p>
+        </p:txBody>
+      </p:sp>
+      <p:sp>
+        <p:nvSpPr>
+          <p:cNvPr id="5" name="Footer Placeholder 4"/>
+          <p:cNvSpPr>
+            <a:spLocks noGrp="1"/>
+          </p:cNvSpPr>
+          <p:nvPr>
+            <p:ph type="ftr" sz="quarter" idx="11"/>
+          </p:nvPr>
+        </p:nvSpPr>
+        <p:spPr/>
+        <p:txBody>
+          <a:bodyPr/>
+          <a:lstStyle/>
+          <a:p>
+            <a:r>
               <a:rPr lang="en-US"/>
-              <a:t>February 2024</a:t>
-            </a:r>
-            <a:endParaRPr lang="en-CA"/>
-          </a:p>
-        </p:txBody>
-      </p:sp>
-      <p:sp>
-        <p:nvSpPr>
-          <p:cNvPr id="5" name="Footer Placeholder 4"/>
-          <p:cNvSpPr>
-            <a:spLocks noGrp="1"/>
-          </p:cNvSpPr>
-          <p:nvPr>
-            <p:ph type="ftr" sz="quarter" idx="11"/>
-          </p:nvPr>
-        </p:nvSpPr>
-        <p:spPr/>
-        <p:txBody>
-          <a:bodyPr/>
-          <a:lstStyle/>
-          <a:p>
-            <a:r>
-              <a:rPr lang="en-US"/>
-              <a:t>Production 1 - Introduction to ML Systems</a:t>
+              <a:t>Production 1: Introduction to ML Systems</a:t>
             </a:r>
             <a:endParaRPr lang="en-CA"/>
           </a:p>
@@ -1792,31 +1790,30 @@
           <a:lstStyle/>
           <a:p>
             <a:r>
+              <a:rPr lang="en-CA"/>
+              <a:t>February 2024</a:t>
+            </a:r>
+          </a:p>
+        </p:txBody>
+      </p:sp>
+      <p:sp>
+        <p:nvSpPr>
+          <p:cNvPr id="6" name="Footer Placeholder 5"/>
+          <p:cNvSpPr>
+            <a:spLocks noGrp="1"/>
+          </p:cNvSpPr>
+          <p:nvPr>
+            <p:ph type="ftr" sz="quarter" idx="11"/>
+          </p:nvPr>
+        </p:nvSpPr>
+        <p:spPr/>
+        <p:txBody>
+          <a:bodyPr/>
+          <a:lstStyle/>
+          <a:p>
+            <a:r>
               <a:rPr lang="en-US"/>
-              <a:t>February 2024</a:t>
-            </a:r>
-            <a:endParaRPr lang="en-CA"/>
-          </a:p>
-        </p:txBody>
-      </p:sp>
-      <p:sp>
-        <p:nvSpPr>
-          <p:cNvPr id="6" name="Footer Placeholder 5"/>
-          <p:cNvSpPr>
-            <a:spLocks noGrp="1"/>
-          </p:cNvSpPr>
-          <p:nvPr>
-            <p:ph type="ftr" sz="quarter" idx="11"/>
-          </p:nvPr>
-        </p:nvSpPr>
-        <p:spPr/>
-        <p:txBody>
-          <a:bodyPr/>
-          <a:lstStyle/>
-          <a:p>
-            <a:r>
-              <a:rPr lang="en-US"/>
-              <a:t>Production 1 - Introduction to ML Systems</a:t>
+              <a:t>Production 1: Introduction to ML Systems</a:t>
             </a:r>
             <a:endParaRPr lang="en-CA"/>
           </a:p>
@@ -2234,31 +2231,30 @@
           <a:lstStyle/>
           <a:p>
             <a:r>
+              <a:rPr lang="en-CA"/>
+              <a:t>February 2024</a:t>
+            </a:r>
+          </a:p>
+        </p:txBody>
+      </p:sp>
+      <p:sp>
+        <p:nvSpPr>
+          <p:cNvPr id="8" name="Footer Placeholder 7"/>
+          <p:cNvSpPr>
+            <a:spLocks noGrp="1"/>
+          </p:cNvSpPr>
+          <p:nvPr>
+            <p:ph type="ftr" sz="quarter" idx="11"/>
+          </p:nvPr>
+        </p:nvSpPr>
+        <p:spPr/>
+        <p:txBody>
+          <a:bodyPr/>
+          <a:lstStyle/>
+          <a:p>
+            <a:r>
               <a:rPr lang="en-US"/>
-              <a:t>February 2024</a:t>
-            </a:r>
-            <a:endParaRPr lang="en-CA"/>
-          </a:p>
-        </p:txBody>
-      </p:sp>
-      <p:sp>
-        <p:nvSpPr>
-          <p:cNvPr id="8" name="Footer Placeholder 7"/>
-          <p:cNvSpPr>
-            <a:spLocks noGrp="1"/>
-          </p:cNvSpPr>
-          <p:nvPr>
-            <p:ph type="ftr" sz="quarter" idx="11"/>
-          </p:nvPr>
-        </p:nvSpPr>
-        <p:spPr/>
-        <p:txBody>
-          <a:bodyPr/>
-          <a:lstStyle/>
-          <a:p>
-            <a:r>
-              <a:rPr lang="en-US"/>
-              <a:t>Production 1 - Introduction to ML Systems</a:t>
+              <a:t>Production 1: Introduction to ML Systems</a:t>
             </a:r>
             <a:endParaRPr lang="en-CA"/>
           </a:p>
@@ -2356,31 +2352,30 @@
           <a:lstStyle/>
           <a:p>
             <a:r>
+              <a:rPr lang="en-CA"/>
+              <a:t>February 2024</a:t>
+            </a:r>
+          </a:p>
+        </p:txBody>
+      </p:sp>
+      <p:sp>
+        <p:nvSpPr>
+          <p:cNvPr id="4" name="Footer Placeholder 3"/>
+          <p:cNvSpPr>
+            <a:spLocks noGrp="1"/>
+          </p:cNvSpPr>
+          <p:nvPr>
+            <p:ph type="ftr" sz="quarter" idx="11"/>
+          </p:nvPr>
+        </p:nvSpPr>
+        <p:spPr/>
+        <p:txBody>
+          <a:bodyPr/>
+          <a:lstStyle/>
+          <a:p>
+            <a:r>
               <a:rPr lang="en-US"/>
-              <a:t>February 2024</a:t>
-            </a:r>
-            <a:endParaRPr lang="en-CA"/>
-          </a:p>
-        </p:txBody>
-      </p:sp>
-      <p:sp>
-        <p:nvSpPr>
-          <p:cNvPr id="4" name="Footer Placeholder 3"/>
-          <p:cNvSpPr>
-            <a:spLocks noGrp="1"/>
-          </p:cNvSpPr>
-          <p:nvPr>
-            <p:ph type="ftr" sz="quarter" idx="11"/>
-          </p:nvPr>
-        </p:nvSpPr>
-        <p:spPr/>
-        <p:txBody>
-          <a:bodyPr/>
-          <a:lstStyle/>
-          <a:p>
-            <a:r>
-              <a:rPr lang="en-US"/>
-              <a:t>Production 1 - Introduction to ML Systems</a:t>
+              <a:t>Production 1: Introduction to ML Systems</a:t>
             </a:r>
             <a:endParaRPr lang="en-CA"/>
           </a:p>
@@ -2455,31 +2450,30 @@
           <a:lstStyle/>
           <a:p>
             <a:r>
+              <a:rPr lang="en-CA"/>
+              <a:t>February 2024</a:t>
+            </a:r>
+          </a:p>
+        </p:txBody>
+      </p:sp>
+      <p:sp>
+        <p:nvSpPr>
+          <p:cNvPr id="3" name="Footer Placeholder 2"/>
+          <p:cNvSpPr>
+            <a:spLocks noGrp="1"/>
+          </p:cNvSpPr>
+          <p:nvPr>
+            <p:ph type="ftr" sz="quarter" idx="11"/>
+          </p:nvPr>
+        </p:nvSpPr>
+        <p:spPr/>
+        <p:txBody>
+          <a:bodyPr/>
+          <a:lstStyle/>
+          <a:p>
+            <a:r>
               <a:rPr lang="en-US"/>
-              <a:t>February 2024</a:t>
-            </a:r>
-            <a:endParaRPr lang="en-CA"/>
-          </a:p>
-        </p:txBody>
-      </p:sp>
-      <p:sp>
-        <p:nvSpPr>
-          <p:cNvPr id="3" name="Footer Placeholder 2"/>
-          <p:cNvSpPr>
-            <a:spLocks noGrp="1"/>
-          </p:cNvSpPr>
-          <p:nvPr>
-            <p:ph type="ftr" sz="quarter" idx="11"/>
-          </p:nvPr>
-        </p:nvSpPr>
-        <p:spPr/>
-        <p:txBody>
-          <a:bodyPr/>
-          <a:lstStyle/>
-          <a:p>
-            <a:r>
-              <a:rPr lang="en-US"/>
-              <a:t>Production 1 - Introduction to ML Systems</a:t>
+              <a:t>Production 1: Introduction to ML Systems</a:t>
             </a:r>
             <a:endParaRPr lang="en-CA"/>
           </a:p>
@@ -2815,31 +2809,30 @@
           <a:lstStyle/>
           <a:p>
             <a:r>
+              <a:rPr lang="en-CA"/>
+              <a:t>February 2024</a:t>
+            </a:r>
+          </a:p>
+        </p:txBody>
+      </p:sp>
+      <p:sp>
+        <p:nvSpPr>
+          <p:cNvPr id="6" name="Footer Placeholder 5"/>
+          <p:cNvSpPr>
+            <a:spLocks noGrp="1"/>
+          </p:cNvSpPr>
+          <p:nvPr>
+            <p:ph type="ftr" sz="quarter" idx="11"/>
+          </p:nvPr>
+        </p:nvSpPr>
+        <p:spPr/>
+        <p:txBody>
+          <a:bodyPr/>
+          <a:lstStyle/>
+          <a:p>
+            <a:r>
               <a:rPr lang="en-US"/>
-              <a:t>February 2024</a:t>
-            </a:r>
-            <a:endParaRPr lang="en-CA"/>
-          </a:p>
-        </p:txBody>
-      </p:sp>
-      <p:sp>
-        <p:nvSpPr>
-          <p:cNvPr id="6" name="Footer Placeholder 5"/>
-          <p:cNvSpPr>
-            <a:spLocks noGrp="1"/>
-          </p:cNvSpPr>
-          <p:nvPr>
-            <p:ph type="ftr" sz="quarter" idx="11"/>
-          </p:nvPr>
-        </p:nvSpPr>
-        <p:spPr/>
-        <p:txBody>
-          <a:bodyPr/>
-          <a:lstStyle/>
-          <a:p>
-            <a:r>
-              <a:rPr lang="en-US"/>
-              <a:t>Production 1 - Introduction to ML Systems</a:t>
+              <a:t>Production 1: Introduction to ML Systems</a:t>
             </a:r>
             <a:endParaRPr lang="en-CA"/>
           </a:p>
@@ -3135,10 +3128,9 @@
           </a:lstStyle>
           <a:p>
             <a:r>
-              <a:rPr lang="en-US"/>
+              <a:rPr lang="en-CA"/>
               <a:t>February 2024</a:t>
             </a:r>
-            <a:endParaRPr lang="en-CA"/>
           </a:p>
         </p:txBody>
       </p:sp>
@@ -3169,7 +3161,7 @@
           <a:p>
             <a:r>
               <a:rPr lang="en-US"/>
-              <a:t>Production 1 - Introduction to ML Systems</a:t>
+              <a:t>Production 1: Introduction to ML Systems</a:t>
             </a:r>
             <a:endParaRPr lang="en-CA"/>
           </a:p>
@@ -3370,10 +3362,9 @@
           </a:lstStyle>
           <a:p>
             <a:r>
-              <a:rPr lang="en-US"/>
+              <a:rPr lang="en-CA"/>
               <a:t>February 2024</a:t>
             </a:r>
-            <a:endParaRPr lang="en-CA"/>
           </a:p>
         </p:txBody>
       </p:sp>
@@ -3412,7 +3403,7 @@
           <a:p>
             <a:r>
               <a:rPr lang="en-US"/>
-              <a:t>Production 1 - Introduction to ML Systems</a:t>
+              <a:t>Production 1: Introduction to ML Systems</a:t>
             </a:r>
             <a:endParaRPr lang="en-CA"/>
           </a:p>
@@ -3919,6 +3910,7 @@
               <a:buNone/>
             </a:pPr>
             <a:r>
+              <a:rPr dirty="0"/>
               <a:t>When to Use ML?</a:t>
             </a:r>
           </a:p>
@@ -3936,73 +3928,103 @@
         </p:nvSpPr>
         <p:spPr/>
         <p:txBody>
-          <a:bodyPr>
-            <a:normAutofit fontScale="70000" lnSpcReduction="20000"/>
+          <a:bodyPr anchor="ctr">
+            <a:normAutofit fontScale="85000" lnSpcReduction="20000"/>
           </a:bodyPr>
           <a:lstStyle/>
           <a:p>
+            <a:pPr marL="0" lvl="0" indent="0">
+              <a:buNone/>
+            </a:pPr>
+            <a:r>
+              <a:rPr lang="en-US" sz="2200" dirty="0"/>
+              <a:t>“Machine learning is an approach to (1) learn (2) complex patterns from (3) existing data and use these patterns to make (4) predictions on (5) unseen data.”</a:t>
+            </a:r>
+          </a:p>
+          <a:p>
+            <a:pPr marL="0" lvl="0" indent="0" algn="r">
+              <a:buNone/>
+            </a:pPr>
+            <a:r>
+              <a:rPr lang="en-US" sz="1600" dirty="0"/>
+              <a:t>(</a:t>
+            </a:r>
+            <a:r>
+              <a:rPr lang="en-US" sz="1600" dirty="0" err="1"/>
+              <a:t>Huyen</a:t>
+            </a:r>
+            <a:r>
+              <a:rPr lang="en-US" sz="1600" dirty="0"/>
+              <a:t>, 2022)</a:t>
+            </a:r>
+          </a:p>
+        </p:txBody>
+      </p:sp>
+      <p:sp>
+        <p:nvSpPr>
+          <p:cNvPr id="4" name="Content Placeholder 3"/>
+          <p:cNvSpPr>
+            <a:spLocks noGrp="1"/>
+          </p:cNvSpPr>
+          <p:nvPr>
+            <p:ph sz="half" idx="2"/>
+          </p:nvPr>
+        </p:nvSpPr>
+        <p:spPr>
+          <a:xfrm>
+            <a:off x="5906553" y="1218010"/>
+            <a:ext cx="5523446" cy="4547452"/>
+          </a:xfrm>
+        </p:spPr>
+        <p:txBody>
+          <a:bodyPr anchor="ctr">
+            <a:normAutofit fontScale="85000" lnSpcReduction="20000"/>
+          </a:bodyPr>
+          <a:lstStyle/>
+          <a:p>
             <a:pPr lvl="0"/>
             <a:r>
+              <a:rPr lang="en-US" dirty="0"/>
               <a:t>A business problem is not the same as an ML problem.</a:t>
             </a:r>
           </a:p>
           <a:p>
             <a:pPr lvl="1"/>
             <a:r>
+              <a:rPr lang="en-US" dirty="0"/>
               <a:t>Generally, a business will be concerned with profit maximization (directly or indirectly): increasing sales, cutting costs, enhancing customer satisfaction, reducing churn, increasing time on the website, etc.</a:t>
             </a:r>
           </a:p>
           <a:p>
             <a:pPr lvl="1"/>
             <a:r>
-              <a:t>The objective of an ML method is to enhance the performance of the task, given more data.</a:t>
+              <a:rPr lang="en-US" dirty="0"/>
+              <a:t>The objective of an ML method is to enhance the performance of the predictive task, given more data.</a:t>
             </a:r>
           </a:p>
           <a:p>
             <a:pPr lvl="1"/>
             <a:r>
-              <a:t>Optimising ML performance metrics does not automatically translate to optimizing business performance.</a:t>
+              <a:rPr lang="en-US" dirty="0" err="1"/>
+              <a:t>Optimising</a:t>
+            </a:r>
+            <a:r>
+              <a:rPr lang="en-US" dirty="0"/>
+              <a:t> ML performance metrics does not automatically translate to optimizing business performance.</a:t>
             </a:r>
           </a:p>
           <a:p>
             <a:pPr lvl="0"/>
             <a:r>
+              <a:rPr lang="en-US" dirty="0"/>
               <a:t>Some of the most popular business applications of ML are in areas where business and ML performance overlap: fraud detection, recommender systems, etc.</a:t>
             </a:r>
           </a:p>
-        </p:txBody>
-      </p:sp>
-      <p:sp>
-        <p:nvSpPr>
-          <p:cNvPr id="4" name="Content Placeholder 3"/>
-          <p:cNvSpPr>
-            <a:spLocks noGrp="1"/>
-          </p:cNvSpPr>
-          <p:nvPr>
-            <p:ph sz="half" idx="2"/>
-          </p:nvPr>
-        </p:nvSpPr>
-        <p:spPr/>
-        <p:txBody>
-          <a:bodyPr>
-            <a:normAutofit fontScale="70000" lnSpcReduction="20000"/>
-          </a:bodyPr>
-          <a:lstStyle/>
           <a:p>
             <a:pPr marL="0" lvl="0" indent="0">
               <a:buNone/>
             </a:pPr>
-            <a:r>
-              <a:t>“Machine learning is an approach to (1) learn (2) complex patterns from (3) existing data and use these patterns to make (4) predictions on (5) unseen data.”</a:t>
-            </a:r>
-          </a:p>
-          <a:p>
-            <a:pPr marL="0" lvl="0" indent="0">
-              <a:buNone/>
-            </a:pPr>
-            <a:r>
-              <a:t>(Huyen, 2022)</a:t>
-            </a:r>
+            <a:endParaRPr sz="1600" dirty="0"/>
           </a:p>
         </p:txBody>
       </p:sp>
@@ -4011,7 +4033,7 @@
           <p:cNvPr id="5" name="Date Placeholder 4">
             <a:extLst>
               <a:ext uri="{FF2B5EF4-FFF2-40B4-BE49-F238E27FC236}">
-                <a16:creationId xmlns:a16="http://schemas.microsoft.com/office/drawing/2014/main" id="{7FD82622-6352-DE75-404C-ECE6570352C9}"/>
+                <a16:creationId xmlns:a16="http://schemas.microsoft.com/office/drawing/2014/main" id="{16FCA5AC-8DE4-1A3B-1836-47E6C288D054}"/>
               </a:ext>
             </a:extLst>
           </p:cNvPr>
@@ -4028,10 +4050,9 @@
           <a:lstStyle/>
           <a:p>
             <a:r>
-              <a:rPr lang="en-US"/>
+              <a:rPr lang="en-CA"/>
               <a:t>February 2024</a:t>
             </a:r>
-            <a:endParaRPr lang="en-CA"/>
           </a:p>
         </p:txBody>
       </p:sp>
@@ -4040,7 +4061,7 @@
           <p:cNvPr id="6" name="Footer Placeholder 5">
             <a:extLst>
               <a:ext uri="{FF2B5EF4-FFF2-40B4-BE49-F238E27FC236}">
-                <a16:creationId xmlns:a16="http://schemas.microsoft.com/office/drawing/2014/main" id="{CF0ED164-F04A-0537-19A3-5C62D4A00A1E}"/>
+                <a16:creationId xmlns:a16="http://schemas.microsoft.com/office/drawing/2014/main" id="{376681D8-1AB2-F82F-5A95-00F807154FE1}"/>
               </a:ext>
             </a:extLst>
           </p:cNvPr>
@@ -4058,7 +4079,7 @@
           <a:p>
             <a:r>
               <a:rPr lang="en-US"/>
-              <a:t>Production 1 - Introduction to ML Systems</a:t>
+              <a:t>Production 1: Introduction to ML Systems</a:t>
             </a:r>
             <a:endParaRPr lang="en-CA"/>
           </a:p>
@@ -4069,7 +4090,7 @@
           <p:cNvPr id="7" name="Slide Number Placeholder 6">
             <a:extLst>
               <a:ext uri="{FF2B5EF4-FFF2-40B4-BE49-F238E27FC236}">
-                <a16:creationId xmlns:a16="http://schemas.microsoft.com/office/drawing/2014/main" id="{1F69A4E1-5BEC-FA85-DCCF-561BAB720CE5}"/>
+                <a16:creationId xmlns:a16="http://schemas.microsoft.com/office/drawing/2014/main" id="{0BD54EAD-714B-9E00-FF0A-7D948136F6C3}"/>
               </a:ext>
             </a:extLst>
           </p:cNvPr>
@@ -4152,7 +4173,7 @@
           <p:cNvPr id="3" name="Date Placeholder 2">
             <a:extLst>
               <a:ext uri="{FF2B5EF4-FFF2-40B4-BE49-F238E27FC236}">
-                <a16:creationId xmlns:a16="http://schemas.microsoft.com/office/drawing/2014/main" id="{C1E252BD-A194-4415-6460-DCAD9337016A}"/>
+                <a16:creationId xmlns:a16="http://schemas.microsoft.com/office/drawing/2014/main" id="{05B39B2C-9DEE-ED4A-8CE5-430221FD8373}"/>
               </a:ext>
             </a:extLst>
           </p:cNvPr>
@@ -4169,10 +4190,9 @@
           <a:lstStyle/>
           <a:p>
             <a:r>
-              <a:rPr lang="en-US"/>
+              <a:rPr lang="en-CA"/>
               <a:t>February 2024</a:t>
             </a:r>
-            <a:endParaRPr lang="en-CA"/>
           </a:p>
         </p:txBody>
       </p:sp>
@@ -4181,7 +4201,7 @@
           <p:cNvPr id="4" name="Footer Placeholder 3">
             <a:extLst>
               <a:ext uri="{FF2B5EF4-FFF2-40B4-BE49-F238E27FC236}">
-                <a16:creationId xmlns:a16="http://schemas.microsoft.com/office/drawing/2014/main" id="{D50FB29C-7851-5EDD-980C-7A0F8CBFE33E}"/>
+                <a16:creationId xmlns:a16="http://schemas.microsoft.com/office/drawing/2014/main" id="{7593DBC8-4337-0097-79DC-C974326C4F9E}"/>
               </a:ext>
             </a:extLst>
           </p:cNvPr>
@@ -4199,7 +4219,7 @@
           <a:p>
             <a:r>
               <a:rPr lang="en-US"/>
-              <a:t>Production 1 - Introduction to ML Systems</a:t>
+              <a:t>Production 1: Introduction to ML Systems</a:t>
             </a:r>
             <a:endParaRPr lang="en-CA"/>
           </a:p>
@@ -4210,7 +4230,7 @@
           <p:cNvPr id="5" name="Slide Number Placeholder 4">
             <a:extLst>
               <a:ext uri="{FF2B5EF4-FFF2-40B4-BE49-F238E27FC236}">
-                <a16:creationId xmlns:a16="http://schemas.microsoft.com/office/drawing/2014/main" id="{A9772560-B07E-8EC9-EB1F-AE5DCBF2D457}"/>
+                <a16:creationId xmlns:a16="http://schemas.microsoft.com/office/drawing/2014/main" id="{77C2F7A4-061A-1E60-7B12-B99CC062C925}"/>
               </a:ext>
             </a:extLst>
           </p:cNvPr>
@@ -4414,7 +4434,7 @@
           <p:cNvPr id="5" name="Date Placeholder 4">
             <a:extLst>
               <a:ext uri="{FF2B5EF4-FFF2-40B4-BE49-F238E27FC236}">
-                <a16:creationId xmlns:a16="http://schemas.microsoft.com/office/drawing/2014/main" id="{31E2F3DA-B718-5277-630C-1A211765D001}"/>
+                <a16:creationId xmlns:a16="http://schemas.microsoft.com/office/drawing/2014/main" id="{2F810745-4C99-0218-9F76-709D4989FC5A}"/>
               </a:ext>
             </a:extLst>
           </p:cNvPr>
@@ -4431,10 +4451,9 @@
           <a:lstStyle/>
           <a:p>
             <a:r>
-              <a:rPr lang="en-US"/>
+              <a:rPr lang="en-CA"/>
               <a:t>February 2024</a:t>
             </a:r>
-            <a:endParaRPr lang="en-CA"/>
           </a:p>
         </p:txBody>
       </p:sp>
@@ -4443,7 +4462,7 @@
           <p:cNvPr id="6" name="Footer Placeholder 5">
             <a:extLst>
               <a:ext uri="{FF2B5EF4-FFF2-40B4-BE49-F238E27FC236}">
-                <a16:creationId xmlns:a16="http://schemas.microsoft.com/office/drawing/2014/main" id="{6F8C6916-B182-A1C0-6B3C-4FD034A726E8}"/>
+                <a16:creationId xmlns:a16="http://schemas.microsoft.com/office/drawing/2014/main" id="{61D16ACB-874C-CE1D-C483-D8F7169FC6BE}"/>
               </a:ext>
             </a:extLst>
           </p:cNvPr>
@@ -4461,7 +4480,7 @@
           <a:p>
             <a:r>
               <a:rPr lang="en-US"/>
-              <a:t>Production 1 - Introduction to ML Systems</a:t>
+              <a:t>Production 1: Introduction to ML Systems</a:t>
             </a:r>
             <a:endParaRPr lang="en-CA"/>
           </a:p>
@@ -4472,7 +4491,7 @@
           <p:cNvPr id="7" name="Slide Number Placeholder 6">
             <a:extLst>
               <a:ext uri="{FF2B5EF4-FFF2-40B4-BE49-F238E27FC236}">
-                <a16:creationId xmlns:a16="http://schemas.microsoft.com/office/drawing/2014/main" id="{8A541A27-064F-5271-8B76-27E1AFA4E51D}"/>
+                <a16:creationId xmlns:a16="http://schemas.microsoft.com/office/drawing/2014/main" id="{62430EB9-4F08-8B09-077D-28DBBCCF2D9E}"/>
               </a:ext>
             </a:extLst>
           </p:cNvPr>
@@ -4558,38 +4577,66 @@
         <p:spPr/>
         <p:txBody>
           <a:bodyPr>
-            <a:normAutofit fontScale="62500" lnSpcReduction="20000"/>
+            <a:normAutofit fontScale="70000" lnSpcReduction="20000"/>
           </a:bodyPr>
           <a:lstStyle/>
           <a:p>
             <a:pPr lvl="0"/>
             <a:r>
+              <a:rPr dirty="0"/>
               <a:t>Unseen data</a:t>
             </a:r>
           </a:p>
           <a:p>
             <a:pPr lvl="1"/>
             <a:r>
+              <a:rPr dirty="0"/>
               <a:t>Unseen data shares patterns with the training data.</a:t>
             </a:r>
           </a:p>
           <a:p>
             <a:pPr lvl="1"/>
             <a:r>
+              <a:rPr dirty="0"/>
               <a:t>The learning method generalizes reasonably well on testing data.</a:t>
             </a:r>
           </a:p>
           <a:p>
             <a:pPr lvl="0"/>
             <a:r>
+              <a:rPr dirty="0"/>
               <a:t>It is repetitive</a:t>
             </a:r>
           </a:p>
           <a:p>
             <a:pPr lvl="1"/>
             <a:r>
+              <a:rPr dirty="0"/>
               <a:t>ML algorithms perform better with experience: repetitive tasks afford such experience.</a:t>
             </a:r>
+            <a:endParaRPr lang="en-US" dirty="0"/>
+          </a:p>
+          <a:p>
+            <a:pPr lvl="0"/>
+            <a:r>
+              <a:rPr lang="en-US" dirty="0"/>
+              <a:t>The cost of wrong predictions is cheap.</a:t>
+            </a:r>
+          </a:p>
+          <a:p>
+            <a:pPr lvl="1"/>
+            <a:r>
+              <a:rPr lang="en-US" dirty="0"/>
+              <a:t>Achieving perfect performance may not be possible.</a:t>
+            </a:r>
+          </a:p>
+          <a:p>
+            <a:pPr lvl="1"/>
+            <a:r>
+              <a:rPr lang="en-US" dirty="0"/>
+              <a:t>Human-level performance or better could be achieved.</a:t>
+            </a:r>
+            <a:endParaRPr dirty="0"/>
           </a:p>
         </p:txBody>
       </p:sp>
@@ -4606,66 +4653,63 @@
         <p:spPr/>
         <p:txBody>
           <a:bodyPr>
-            <a:normAutofit fontScale="62500" lnSpcReduction="20000"/>
+            <a:normAutofit fontScale="70000" lnSpcReduction="20000"/>
           </a:bodyPr>
           <a:lstStyle/>
           <a:p>
             <a:pPr lvl="0"/>
             <a:r>
-              <a:t>The cost of wrong predictions is cheap.</a:t>
+              <a:rPr dirty="0"/>
+              <a:t>It’s at scale</a:t>
             </a:r>
           </a:p>
           <a:p>
             <a:pPr lvl="1"/>
             <a:r>
-              <a:t>Achieving perfect performance may not be possible.</a:t>
+              <a:rPr dirty="0"/>
+              <a:t>Upfront costs are involved: infrastructure, staff, DevOps.</a:t>
             </a:r>
           </a:p>
           <a:p>
             <a:pPr lvl="1"/>
             <a:r>
-              <a:t>Human-level performance or better could be achieved.</a:t>
+              <a:rPr dirty="0"/>
+              <a:t>Setting up an ML system that caters to many ML models concurrently.</a:t>
             </a:r>
           </a:p>
           <a:p>
             <a:pPr lvl="0"/>
             <a:r>
-              <a:t>It’s at scale</a:t>
+              <a:rPr dirty="0"/>
+              <a:t>Patterns are constantly changing</a:t>
             </a:r>
           </a:p>
           <a:p>
             <a:pPr lvl="1"/>
             <a:r>
-              <a:t>Upfront costs are involved: infrastructure, staff, DevOps.</a:t>
+              <a:rPr dirty="0"/>
+              <a:t>Hard-coded solutions can become stale and outdated.</a:t>
             </a:r>
           </a:p>
           <a:p>
             <a:pPr lvl="1"/>
             <a:r>
-              <a:t>Setting up an ML system that caters to many ML models concurrently.</a:t>
-            </a:r>
-          </a:p>
-          <a:p>
-            <a:pPr lvl="0"/>
-            <a:r>
-              <a:t>Patterns are constantly changing</a:t>
+              <a:rPr dirty="0"/>
+              <a:t>The ML system’s environment changes: economics, social </a:t>
+            </a:r>
+            <a:r>
+              <a:rPr dirty="0" err="1"/>
+              <a:t>behaviour</a:t>
+            </a:r>
+            <a:r>
+              <a:rPr dirty="0"/>
+              <a:t>, trends, etc.</a:t>
             </a:r>
           </a:p>
           <a:p>
             <a:pPr lvl="1"/>
             <a:r>
-              <a:t>Hard-coded solutions can become stale and outdated.</a:t>
-            </a:r>
-          </a:p>
-          <a:p>
-            <a:pPr lvl="1"/>
-            <a:r>
-              <a:t>The ML system’s environment changes: economics, social behaviour, trends, etc.</a:t>
-            </a:r>
-          </a:p>
-          <a:p>
-            <a:pPr lvl="1"/>
-            <a:r>
+              <a:rPr dirty="0"/>
               <a:t>Feedback: the ML system informs a company’s actions, affecting, in turn, the company’s interactions with the external environment.</a:t>
             </a:r>
           </a:p>
@@ -4676,7 +4720,7 @@
           <p:cNvPr id="5" name="Date Placeholder 4">
             <a:extLst>
               <a:ext uri="{FF2B5EF4-FFF2-40B4-BE49-F238E27FC236}">
-                <a16:creationId xmlns:a16="http://schemas.microsoft.com/office/drawing/2014/main" id="{2B3AEF5B-B43D-A7DD-CC40-EA9ECBC0C372}"/>
+                <a16:creationId xmlns:a16="http://schemas.microsoft.com/office/drawing/2014/main" id="{105DAAF0-FB05-5BE2-13DF-9DFAC76045DC}"/>
               </a:ext>
             </a:extLst>
           </p:cNvPr>
@@ -4693,10 +4737,9 @@
           <a:lstStyle/>
           <a:p>
             <a:r>
-              <a:rPr lang="en-US"/>
+              <a:rPr lang="en-CA"/>
               <a:t>February 2024</a:t>
             </a:r>
-            <a:endParaRPr lang="en-CA"/>
           </a:p>
         </p:txBody>
       </p:sp>
@@ -4705,7 +4748,7 @@
           <p:cNvPr id="6" name="Footer Placeholder 5">
             <a:extLst>
               <a:ext uri="{FF2B5EF4-FFF2-40B4-BE49-F238E27FC236}">
-                <a16:creationId xmlns:a16="http://schemas.microsoft.com/office/drawing/2014/main" id="{CC71ADE2-2143-5A49-A800-866FBF73DAC9}"/>
+                <a16:creationId xmlns:a16="http://schemas.microsoft.com/office/drawing/2014/main" id="{D84811C4-FC3B-00DF-987B-274719C8B1EB}"/>
               </a:ext>
             </a:extLst>
           </p:cNvPr>
@@ -4723,7 +4766,7 @@
           <a:p>
             <a:r>
               <a:rPr lang="en-US"/>
-              <a:t>Production 1 - Introduction to ML Systems</a:t>
+              <a:t>Production 1: Introduction to ML Systems</a:t>
             </a:r>
             <a:endParaRPr lang="en-CA"/>
           </a:p>
@@ -4734,7 +4777,7 @@
           <p:cNvPr id="7" name="Slide Number Placeholder 6">
             <a:extLst>
               <a:ext uri="{FF2B5EF4-FFF2-40B4-BE49-F238E27FC236}">
-                <a16:creationId xmlns:a16="http://schemas.microsoft.com/office/drawing/2014/main" id="{370D08FE-5296-9868-F341-441E01A8B249}"/>
+                <a16:creationId xmlns:a16="http://schemas.microsoft.com/office/drawing/2014/main" id="{9584D558-F8AA-FC3F-D9F8-BD552EC9AD9B}"/>
               </a:ext>
             </a:extLst>
           </p:cNvPr>
@@ -4799,8 +4842,8 @@
         </p:blipFill>
         <p:spPr bwMode="auto">
           <a:xfrm>
-            <a:off x="4640025" y="2333625"/>
-            <a:ext cx="7395050" cy="2559050"/>
+            <a:off x="4795015" y="2387259"/>
+            <a:ext cx="7085070" cy="2451782"/>
           </a:xfrm>
           <a:prstGeom prst="rect">
             <a:avLst/>
@@ -4927,8 +4970,8 @@
               <a:buNone/>
             </a:pPr>
             <a:r>
-              <a:rPr dirty="0"/>
-              <a:t>(Sculley, 2019)</a:t>
+              <a:rPr sz="1100"/>
+              <a:t>(Sculley, 2015)</a:t>
             </a:r>
           </a:p>
         </p:txBody>
@@ -4938,7 +4981,7 @@
           <p:cNvPr id="6" name="Date Placeholder 5">
             <a:extLst>
               <a:ext uri="{FF2B5EF4-FFF2-40B4-BE49-F238E27FC236}">
-                <a16:creationId xmlns:a16="http://schemas.microsoft.com/office/drawing/2014/main" id="{9C668585-FB41-E032-7388-BA09CF2ED5B2}"/>
+                <a16:creationId xmlns:a16="http://schemas.microsoft.com/office/drawing/2014/main" id="{32A2649E-D44C-4D75-E3FC-64C56EB43A4C}"/>
               </a:ext>
             </a:extLst>
           </p:cNvPr>
@@ -4955,10 +4998,9 @@
           <a:lstStyle/>
           <a:p>
             <a:r>
-              <a:rPr lang="en-US"/>
+              <a:rPr lang="en-CA"/>
               <a:t>February 2024</a:t>
             </a:r>
-            <a:endParaRPr lang="en-CA"/>
           </a:p>
         </p:txBody>
       </p:sp>
@@ -4967,7 +5009,7 @@
           <p:cNvPr id="7" name="Footer Placeholder 6">
             <a:extLst>
               <a:ext uri="{FF2B5EF4-FFF2-40B4-BE49-F238E27FC236}">
-                <a16:creationId xmlns:a16="http://schemas.microsoft.com/office/drawing/2014/main" id="{C4BE930E-B576-65A6-7E5D-BFCB3CB9E5B0}"/>
+                <a16:creationId xmlns:a16="http://schemas.microsoft.com/office/drawing/2014/main" id="{31631B9A-28A8-1F57-ACC8-24F9D4C44FCA}"/>
               </a:ext>
             </a:extLst>
           </p:cNvPr>
@@ -4985,7 +5027,7 @@
           <a:p>
             <a:r>
               <a:rPr lang="en-US"/>
-              <a:t>Production 1 - Introduction to ML Systems</a:t>
+              <a:t>Production 1: Introduction to ML Systems</a:t>
             </a:r>
             <a:endParaRPr lang="en-CA"/>
           </a:p>
@@ -4996,7 +5038,7 @@
           <p:cNvPr id="8" name="Slide Number Placeholder 7">
             <a:extLst>
               <a:ext uri="{FF2B5EF4-FFF2-40B4-BE49-F238E27FC236}">
-                <a16:creationId xmlns:a16="http://schemas.microsoft.com/office/drawing/2014/main" id="{8318ABEF-2DA7-EE09-1F19-59BEEA2EA77F}"/>
+                <a16:creationId xmlns:a16="http://schemas.microsoft.com/office/drawing/2014/main" id="{9DC2657F-8C9F-E6E3-CF2E-1351F5FFD3DA}"/>
               </a:ext>
             </a:extLst>
           </p:cNvPr>
@@ -5079,7 +5121,7 @@
           <p:cNvPr id="3" name="Date Placeholder 2">
             <a:extLst>
               <a:ext uri="{FF2B5EF4-FFF2-40B4-BE49-F238E27FC236}">
-                <a16:creationId xmlns:a16="http://schemas.microsoft.com/office/drawing/2014/main" id="{E9D03D96-0663-57C8-683E-3D6C859A79FB}"/>
+                <a16:creationId xmlns:a16="http://schemas.microsoft.com/office/drawing/2014/main" id="{242C3EC9-83F1-20E8-E9E8-C284C2FB448C}"/>
               </a:ext>
             </a:extLst>
           </p:cNvPr>
@@ -5096,10 +5138,9 @@
           <a:lstStyle/>
           <a:p>
             <a:r>
-              <a:rPr lang="en-US"/>
+              <a:rPr lang="en-CA"/>
               <a:t>February 2024</a:t>
             </a:r>
-            <a:endParaRPr lang="en-CA"/>
           </a:p>
         </p:txBody>
       </p:sp>
@@ -5108,7 +5149,7 @@
           <p:cNvPr id="4" name="Footer Placeholder 3">
             <a:extLst>
               <a:ext uri="{FF2B5EF4-FFF2-40B4-BE49-F238E27FC236}">
-                <a16:creationId xmlns:a16="http://schemas.microsoft.com/office/drawing/2014/main" id="{1738B0A6-7BA9-48F2-452E-D1843A7635A5}"/>
+                <a16:creationId xmlns:a16="http://schemas.microsoft.com/office/drawing/2014/main" id="{F662FDAA-C0F3-46D3-8F17-F314A77EBF9D}"/>
               </a:ext>
             </a:extLst>
           </p:cNvPr>
@@ -5126,7 +5167,7 @@
           <a:p>
             <a:r>
               <a:rPr lang="en-US"/>
-              <a:t>Production 1 - Introduction to ML Systems</a:t>
+              <a:t>Production 1: Introduction to ML Systems</a:t>
             </a:r>
             <a:endParaRPr lang="en-CA"/>
           </a:p>
@@ -5137,7 +5178,7 @@
           <p:cNvPr id="5" name="Slide Number Placeholder 4">
             <a:extLst>
               <a:ext uri="{FF2B5EF4-FFF2-40B4-BE49-F238E27FC236}">
-                <a16:creationId xmlns:a16="http://schemas.microsoft.com/office/drawing/2014/main" id="{37280957-07A2-94DC-FE3B-A6F9CC8C1336}"/>
+                <a16:creationId xmlns:a16="http://schemas.microsoft.com/office/drawing/2014/main" id="{705CC700-C8A8-52DA-D1BC-F07B37DC79E4}"/>
               </a:ext>
             </a:extLst>
           </p:cNvPr>
@@ -5574,7 +5615,7 @@
           <p:cNvPr id="3" name="Date Placeholder 2">
             <a:extLst>
               <a:ext uri="{FF2B5EF4-FFF2-40B4-BE49-F238E27FC236}">
-                <a16:creationId xmlns:a16="http://schemas.microsoft.com/office/drawing/2014/main" id="{4DCA8036-E02C-8ED5-C936-6E1DAECC1F4E}"/>
+                <a16:creationId xmlns:a16="http://schemas.microsoft.com/office/drawing/2014/main" id="{CF7805E4-4BE2-4F97-5C09-34EF6A68DF13}"/>
               </a:ext>
             </a:extLst>
           </p:cNvPr>
@@ -5591,10 +5632,9 @@
           <a:lstStyle/>
           <a:p>
             <a:r>
-              <a:rPr lang="en-US"/>
+              <a:rPr lang="en-CA"/>
               <a:t>February 2024</a:t>
             </a:r>
-            <a:endParaRPr lang="en-CA"/>
           </a:p>
         </p:txBody>
       </p:sp>
@@ -5603,7 +5643,7 @@
           <p:cNvPr id="4" name="Footer Placeholder 3">
             <a:extLst>
               <a:ext uri="{FF2B5EF4-FFF2-40B4-BE49-F238E27FC236}">
-                <a16:creationId xmlns:a16="http://schemas.microsoft.com/office/drawing/2014/main" id="{2DC508CF-1E36-C9BD-AC45-B761406971E2}"/>
+                <a16:creationId xmlns:a16="http://schemas.microsoft.com/office/drawing/2014/main" id="{C47F4BE9-5F78-037E-BB58-A0B1483B9D54}"/>
               </a:ext>
             </a:extLst>
           </p:cNvPr>
@@ -5621,7 +5661,7 @@
           <a:p>
             <a:r>
               <a:rPr lang="en-US"/>
-              <a:t>Production 1 - Introduction to ML Systems</a:t>
+              <a:t>Production 1: Introduction to ML Systems</a:t>
             </a:r>
             <a:endParaRPr lang="en-CA"/>
           </a:p>
@@ -5632,7 +5672,7 @@
           <p:cNvPr id="5" name="Slide Number Placeholder 4">
             <a:extLst>
               <a:ext uri="{FF2B5EF4-FFF2-40B4-BE49-F238E27FC236}">
-                <a16:creationId xmlns:a16="http://schemas.microsoft.com/office/drawing/2014/main" id="{92AB7844-3C62-5084-9E02-795EC9C55F3F}"/>
+                <a16:creationId xmlns:a16="http://schemas.microsoft.com/office/drawing/2014/main" id="{42272F6A-906A-A725-E636-66CC495257EE}"/>
               </a:ext>
             </a:extLst>
           </p:cNvPr>
@@ -5653,6 +5693,42 @@
               <a:t>16</a:t>
             </a:fld>
             <a:endParaRPr lang="en-CA"/>
+          </a:p>
+        </p:txBody>
+      </p:sp>
+      <p:sp>
+        <p:nvSpPr>
+          <p:cNvPr id="7" name="TextBox 3">
+            <a:extLst>
+              <a:ext uri="{FF2B5EF4-FFF2-40B4-BE49-F238E27FC236}">
+                <a16:creationId xmlns:a16="http://schemas.microsoft.com/office/drawing/2014/main" id="{61DEC4CE-75F5-9B4A-7C2E-E78B90377206}"/>
+              </a:ext>
+            </a:extLst>
+          </p:cNvPr>
+          <p:cNvSpPr txBox="1"/>
+          <p:nvPr/>
+        </p:nvSpPr>
+        <p:spPr>
+          <a:xfrm>
+            <a:off x="8375949" y="4551629"/>
+            <a:ext cx="4660900" cy="508000"/>
+          </a:xfrm>
+          <a:prstGeom prst="rect">
+            <a:avLst/>
+          </a:prstGeom>
+          <a:noFill/>
+        </p:spPr>
+        <p:txBody>
+          <a:bodyPr/>
+          <a:lstStyle/>
+          <a:p>
+            <a:pPr marL="0" lvl="0" indent="0" algn="ctr">
+              <a:buNone/>
+            </a:pPr>
+            <a:r>
+              <a:rPr sz="1100"/>
+              <a:t>(Huyen, 2022)</a:t>
+            </a:r>
           </a:p>
         </p:txBody>
       </p:sp>
@@ -5715,94 +5791,121 @@
             <p:ph sz="half" idx="1"/>
           </p:nvPr>
         </p:nvSpPr>
-        <p:spPr/>
+        <p:spPr>
+          <a:xfrm>
+            <a:off x="676656" y="1577187"/>
+            <a:ext cx="4663440" cy="4781279"/>
+          </a:xfrm>
+        </p:spPr>
         <p:txBody>
           <a:bodyPr>
-            <a:normAutofit fontScale="47500" lnSpcReduction="20000"/>
+            <a:normAutofit fontScale="70000" lnSpcReduction="20000"/>
           </a:bodyPr>
           <a:lstStyle/>
           <a:p>
             <a:pPr lvl="0"/>
             <a:r>
+              <a:rPr dirty="0"/>
               <a:t>Different stakeholders require different things:</a:t>
             </a:r>
           </a:p>
           <a:p>
             <a:pPr lvl="1"/>
             <a:r>
+              <a:rPr dirty="0"/>
               <a:t>ML engineers: increase performance or efficiency of recommender system.</a:t>
             </a:r>
           </a:p>
           <a:p>
             <a:pPr lvl="1"/>
             <a:r>
+              <a:rPr dirty="0"/>
               <a:t>Sales: recommend more profitable options.</a:t>
             </a:r>
           </a:p>
           <a:p>
             <a:pPr lvl="1"/>
             <a:r>
+              <a:rPr dirty="0"/>
               <a:t>Product: reduce latency.</a:t>
             </a:r>
           </a:p>
           <a:p>
             <a:pPr lvl="1"/>
             <a:r>
+              <a:rPr dirty="0"/>
               <a:t>Platform: stability.</a:t>
             </a:r>
           </a:p>
           <a:p>
             <a:pPr lvl="1"/>
             <a:r>
+              <a:rPr dirty="0"/>
               <a:t>Manager: control costs.</a:t>
             </a:r>
           </a:p>
           <a:p>
             <a:pPr lvl="0"/>
             <a:r>
+              <a:rPr dirty="0"/>
               <a:t>Computational priorities</a:t>
             </a:r>
           </a:p>
           <a:p>
             <a:pPr lvl="1"/>
             <a:r>
+              <a:rPr dirty="0"/>
               <a:t>During model development:</a:t>
             </a:r>
           </a:p>
           <a:p>
             <a:pPr lvl="2"/>
             <a:r>
+              <a:rPr dirty="0"/>
               <a:t>Training is the bottleneck.</a:t>
             </a:r>
           </a:p>
           <a:p>
             <a:pPr lvl="2"/>
             <a:r>
+              <a:rPr dirty="0"/>
               <a:t>Throughput, the number of cases processed, should be maximized.</a:t>
             </a:r>
           </a:p>
           <a:p>
             <a:pPr lvl="1"/>
             <a:r>
+              <a:rPr dirty="0"/>
               <a:t>In production:</a:t>
             </a:r>
           </a:p>
           <a:p>
             <a:pPr lvl="2"/>
             <a:r>
+              <a:rPr dirty="0"/>
               <a:t>Fast inference is desirable.</a:t>
             </a:r>
           </a:p>
           <a:p>
             <a:pPr lvl="2"/>
             <a:r>
+              <a:rPr dirty="0"/>
               <a:t>Latency, the time between when a query is received and when it is addressed, should be minimized.</a:t>
             </a:r>
           </a:p>
           <a:p>
             <a:pPr lvl="2"/>
             <a:r>
-              <a:t>Latency is usually measured using percentiles of time elapsed (e.g., 99th percentile should be below X ms.)</a:t>
+              <a:rPr dirty="0"/>
+              <a:t>Latency is usually measured using percentiles of time elapsed (e.g., 99th percentile should be below X </a:t>
+            </a:r>
+            <a:r>
+              <a:rPr dirty="0" err="1"/>
+              <a:t>ms.</a:t>
+            </a:r>
+            <a:r>
+              <a:rPr dirty="0"/>
+              <a:t>)</a:t>
             </a:r>
           </a:p>
         </p:txBody>
@@ -5861,6 +5964,7 @@
               <a:buNone/>
             </a:pPr>
             <a:r>
+              <a:rPr sz="1100"/>
               <a:t>(Huyen, 2022)</a:t>
             </a:r>
           </a:p>
@@ -5871,7 +5975,7 @@
           <p:cNvPr id="6" name="Date Placeholder 5">
             <a:extLst>
               <a:ext uri="{FF2B5EF4-FFF2-40B4-BE49-F238E27FC236}">
-                <a16:creationId xmlns:a16="http://schemas.microsoft.com/office/drawing/2014/main" id="{8B7D930F-8A45-41A9-52B5-4AE136AC3298}"/>
+                <a16:creationId xmlns:a16="http://schemas.microsoft.com/office/drawing/2014/main" id="{17254DA0-BE8C-3413-C7EA-E3B6FF66C7CF}"/>
               </a:ext>
             </a:extLst>
           </p:cNvPr>
@@ -5888,10 +5992,9 @@
           <a:lstStyle/>
           <a:p>
             <a:r>
-              <a:rPr lang="en-US"/>
+              <a:rPr lang="en-CA"/>
               <a:t>February 2024</a:t>
             </a:r>
-            <a:endParaRPr lang="en-CA"/>
           </a:p>
         </p:txBody>
       </p:sp>
@@ -5900,7 +6003,7 @@
           <p:cNvPr id="7" name="Footer Placeholder 6">
             <a:extLst>
               <a:ext uri="{FF2B5EF4-FFF2-40B4-BE49-F238E27FC236}">
-                <a16:creationId xmlns:a16="http://schemas.microsoft.com/office/drawing/2014/main" id="{D189855D-7B19-DC5D-E88C-854C6F51EA13}"/>
+                <a16:creationId xmlns:a16="http://schemas.microsoft.com/office/drawing/2014/main" id="{5AA94AA3-46E6-D8C8-7DBA-05FAEC74C859}"/>
               </a:ext>
             </a:extLst>
           </p:cNvPr>
@@ -5918,7 +6021,7 @@
           <a:p>
             <a:r>
               <a:rPr lang="en-US"/>
-              <a:t>Production 1 - Introduction to ML Systems</a:t>
+              <a:t>Production 1: Introduction to ML Systems</a:t>
             </a:r>
             <a:endParaRPr lang="en-CA"/>
           </a:p>
@@ -5929,7 +6032,7 @@
           <p:cNvPr id="8" name="Slide Number Placeholder 7">
             <a:extLst>
               <a:ext uri="{FF2B5EF4-FFF2-40B4-BE49-F238E27FC236}">
-                <a16:creationId xmlns:a16="http://schemas.microsoft.com/office/drawing/2014/main" id="{4CB1385F-319F-D622-D3C9-0339E5527606}"/>
+                <a16:creationId xmlns:a16="http://schemas.microsoft.com/office/drawing/2014/main" id="{3E6EF17E-7A26-08FE-3178-411D9632EE20}"/>
               </a:ext>
             </a:extLst>
           </p:cNvPr>
@@ -6109,7 +6212,7 @@
           <p:cNvPr id="5" name="Date Placeholder 4">
             <a:extLst>
               <a:ext uri="{FF2B5EF4-FFF2-40B4-BE49-F238E27FC236}">
-                <a16:creationId xmlns:a16="http://schemas.microsoft.com/office/drawing/2014/main" id="{CC832941-0FCA-6FF4-4CFE-2CAE3DD51061}"/>
+                <a16:creationId xmlns:a16="http://schemas.microsoft.com/office/drawing/2014/main" id="{16C09E25-AD61-2195-D2C7-829E4713A48B}"/>
               </a:ext>
             </a:extLst>
           </p:cNvPr>
@@ -6126,10 +6229,9 @@
           <a:lstStyle/>
           <a:p>
             <a:r>
-              <a:rPr lang="en-US"/>
+              <a:rPr lang="en-CA"/>
               <a:t>February 2024</a:t>
             </a:r>
-            <a:endParaRPr lang="en-CA"/>
           </a:p>
         </p:txBody>
       </p:sp>
@@ -6138,7 +6240,7 @@
           <p:cNvPr id="6" name="Footer Placeholder 5">
             <a:extLst>
               <a:ext uri="{FF2B5EF4-FFF2-40B4-BE49-F238E27FC236}">
-                <a16:creationId xmlns:a16="http://schemas.microsoft.com/office/drawing/2014/main" id="{FC3EF0C6-1C32-5AA8-9E85-2978B797D69F}"/>
+                <a16:creationId xmlns:a16="http://schemas.microsoft.com/office/drawing/2014/main" id="{5706CCA0-8B85-86BD-1964-2E61A5B88703}"/>
               </a:ext>
             </a:extLst>
           </p:cNvPr>
@@ -6156,7 +6258,7 @@
           <a:p>
             <a:r>
               <a:rPr lang="en-US"/>
-              <a:t>Production 1 - Introduction to ML Systems</a:t>
+              <a:t>Production 1: Introduction to ML Systems</a:t>
             </a:r>
             <a:endParaRPr lang="en-CA"/>
           </a:p>
@@ -6167,7 +6269,7 @@
           <p:cNvPr id="7" name="Slide Number Placeholder 6">
             <a:extLst>
               <a:ext uri="{FF2B5EF4-FFF2-40B4-BE49-F238E27FC236}">
-                <a16:creationId xmlns:a16="http://schemas.microsoft.com/office/drawing/2014/main" id="{CFF0122D-B3D3-2E92-EB6E-06F6F25F4E9A}"/>
+                <a16:creationId xmlns:a16="http://schemas.microsoft.com/office/drawing/2014/main" id="{81398C91-AAC9-602E-6686-D272C7ABA215}"/>
               </a:ext>
             </a:extLst>
           </p:cNvPr>
@@ -6250,7 +6352,7 @@
           <p:cNvPr id="3" name="Date Placeholder 2">
             <a:extLst>
               <a:ext uri="{FF2B5EF4-FFF2-40B4-BE49-F238E27FC236}">
-                <a16:creationId xmlns:a16="http://schemas.microsoft.com/office/drawing/2014/main" id="{284693DC-2ACD-3A8B-62F4-A27AC9A727EA}"/>
+                <a16:creationId xmlns:a16="http://schemas.microsoft.com/office/drawing/2014/main" id="{2689F3D7-B55A-A7E3-E892-E3DF9825DE92}"/>
               </a:ext>
             </a:extLst>
           </p:cNvPr>
@@ -6267,10 +6369,9 @@
           <a:lstStyle/>
           <a:p>
             <a:r>
-              <a:rPr lang="en-US"/>
+              <a:rPr lang="en-CA"/>
               <a:t>February 2024</a:t>
             </a:r>
-            <a:endParaRPr lang="en-CA"/>
           </a:p>
         </p:txBody>
       </p:sp>
@@ -6279,7 +6380,7 @@
           <p:cNvPr id="4" name="Footer Placeholder 3">
             <a:extLst>
               <a:ext uri="{FF2B5EF4-FFF2-40B4-BE49-F238E27FC236}">
-                <a16:creationId xmlns:a16="http://schemas.microsoft.com/office/drawing/2014/main" id="{C8A5FA0F-2D37-6EDF-025C-1FAF7607598A}"/>
+                <a16:creationId xmlns:a16="http://schemas.microsoft.com/office/drawing/2014/main" id="{45E78932-B795-3A72-8263-10989ECFD7F5}"/>
               </a:ext>
             </a:extLst>
           </p:cNvPr>
@@ -6297,7 +6398,7 @@
           <a:p>
             <a:r>
               <a:rPr lang="en-US"/>
-              <a:t>Production 1 - Introduction to ML Systems</a:t>
+              <a:t>Production 1: Introduction to ML Systems</a:t>
             </a:r>
             <a:endParaRPr lang="en-CA"/>
           </a:p>
@@ -6308,7 +6409,7 @@
           <p:cNvPr id="5" name="Slide Number Placeholder 4">
             <a:extLst>
               <a:ext uri="{FF2B5EF4-FFF2-40B4-BE49-F238E27FC236}">
-                <a16:creationId xmlns:a16="http://schemas.microsoft.com/office/drawing/2014/main" id="{89ADDE46-DE60-5A32-0864-13837EB87BFE}"/>
+                <a16:creationId xmlns:a16="http://schemas.microsoft.com/office/drawing/2014/main" id="{3AC6D101-2798-FD7A-9643-53815A6119BA}"/>
               </a:ext>
             </a:extLst>
           </p:cNvPr>
@@ -6391,7 +6492,7 @@
           <p:cNvPr id="3" name="Date Placeholder 2">
             <a:extLst>
               <a:ext uri="{FF2B5EF4-FFF2-40B4-BE49-F238E27FC236}">
-                <a16:creationId xmlns:a16="http://schemas.microsoft.com/office/drawing/2014/main" id="{41903A2A-AE32-9703-1505-85D689A2798C}"/>
+                <a16:creationId xmlns:a16="http://schemas.microsoft.com/office/drawing/2014/main" id="{86E39536-E92C-78EB-5F11-2C80AF794022}"/>
               </a:ext>
             </a:extLst>
           </p:cNvPr>
@@ -6408,10 +6509,9 @@
           <a:lstStyle/>
           <a:p>
             <a:r>
-              <a:rPr lang="en-US"/>
+              <a:rPr lang="en-CA"/>
               <a:t>February 2024</a:t>
             </a:r>
-            <a:endParaRPr lang="en-CA"/>
           </a:p>
         </p:txBody>
       </p:sp>
@@ -6420,7 +6520,7 @@
           <p:cNvPr id="4" name="Footer Placeholder 3">
             <a:extLst>
               <a:ext uri="{FF2B5EF4-FFF2-40B4-BE49-F238E27FC236}">
-                <a16:creationId xmlns:a16="http://schemas.microsoft.com/office/drawing/2014/main" id="{BC2D3696-964F-29F3-863F-7F228B45FF8E}"/>
+                <a16:creationId xmlns:a16="http://schemas.microsoft.com/office/drawing/2014/main" id="{6CD2C594-40B5-731D-9177-504D7B3FAA9D}"/>
               </a:ext>
             </a:extLst>
           </p:cNvPr>
@@ -6438,7 +6538,7 @@
           <a:p>
             <a:r>
               <a:rPr lang="en-US"/>
-              <a:t>Production 1 - Introduction to ML Systems</a:t>
+              <a:t>Production 1: Introduction to ML Systems</a:t>
             </a:r>
             <a:endParaRPr lang="en-CA"/>
           </a:p>
@@ -6449,7 +6549,7 @@
           <p:cNvPr id="5" name="Slide Number Placeholder 4">
             <a:extLst>
               <a:ext uri="{FF2B5EF4-FFF2-40B4-BE49-F238E27FC236}">
-                <a16:creationId xmlns:a16="http://schemas.microsoft.com/office/drawing/2014/main" id="{55CED265-5759-AAEC-8CFC-DD24814018C7}"/>
+                <a16:creationId xmlns:a16="http://schemas.microsoft.com/office/drawing/2014/main" id="{CE5A0386-E2CF-F7EB-8F1B-992CAF80EC73}"/>
               </a:ext>
             </a:extLst>
           </p:cNvPr>
@@ -6538,8 +6638,8 @@
         </p:blipFill>
         <p:spPr bwMode="auto">
           <a:xfrm>
-            <a:off x="2895600" y="2006600"/>
-            <a:ext cx="6286500" cy="3251200"/>
+            <a:off x="2109787" y="1600200"/>
+            <a:ext cx="7858126" cy="4064000"/>
           </a:xfrm>
           <a:prstGeom prst="rect">
             <a:avLst/>
@@ -6560,7 +6660,7 @@
         </p:nvSpPr>
         <p:spPr>
           <a:xfrm>
-            <a:off x="673100" y="5257800"/>
+            <a:off x="673100" y="5908313"/>
             <a:ext cx="10744200" cy="508000"/>
           </a:xfrm>
           <a:prstGeom prst="rect">
@@ -6576,7 +6676,16 @@
               <a:buNone/>
             </a:pPr>
             <a:r>
-              <a:t>(Huyen, 2022)</a:t>
+              <a:rPr sz="1100" dirty="0"/>
+              <a:t>(</a:t>
+            </a:r>
+            <a:r>
+              <a:rPr sz="1100" dirty="0" err="1"/>
+              <a:t>Huyen</a:t>
+            </a:r>
+            <a:r>
+              <a:rPr sz="1100" dirty="0"/>
+              <a:t>, 2022)</a:t>
             </a:r>
           </a:p>
         </p:txBody>
@@ -6586,7 +6695,7 @@
           <p:cNvPr id="5" name="Date Placeholder 4">
             <a:extLst>
               <a:ext uri="{FF2B5EF4-FFF2-40B4-BE49-F238E27FC236}">
-                <a16:creationId xmlns:a16="http://schemas.microsoft.com/office/drawing/2014/main" id="{C54A99A6-8E56-8F4D-A42B-45E1A08266F6}"/>
+                <a16:creationId xmlns:a16="http://schemas.microsoft.com/office/drawing/2014/main" id="{A720733E-A370-28E5-29C0-2AB1A7A41862}"/>
               </a:ext>
             </a:extLst>
           </p:cNvPr>
@@ -6603,10 +6712,9 @@
           <a:lstStyle/>
           <a:p>
             <a:r>
-              <a:rPr lang="en-US"/>
+              <a:rPr lang="en-CA"/>
               <a:t>February 2024</a:t>
             </a:r>
-            <a:endParaRPr lang="en-CA"/>
           </a:p>
         </p:txBody>
       </p:sp>
@@ -6615,7 +6723,7 @@
           <p:cNvPr id="6" name="Footer Placeholder 5">
             <a:extLst>
               <a:ext uri="{FF2B5EF4-FFF2-40B4-BE49-F238E27FC236}">
-                <a16:creationId xmlns:a16="http://schemas.microsoft.com/office/drawing/2014/main" id="{5B8BADC5-5901-2A42-50D7-7C5A51EA7780}"/>
+                <a16:creationId xmlns:a16="http://schemas.microsoft.com/office/drawing/2014/main" id="{90BF99BD-4E0B-0E61-210F-B48FE5E32DD7}"/>
               </a:ext>
             </a:extLst>
           </p:cNvPr>
@@ -6633,7 +6741,7 @@
           <a:p>
             <a:r>
               <a:rPr lang="en-US"/>
-              <a:t>Production 1 - Introduction to ML Systems</a:t>
+              <a:t>Production 1: Introduction to ML Systems</a:t>
             </a:r>
             <a:endParaRPr lang="en-CA"/>
           </a:p>
@@ -6644,7 +6752,7 @@
           <p:cNvPr id="7" name="Slide Number Placeholder 6">
             <a:extLst>
               <a:ext uri="{FF2B5EF4-FFF2-40B4-BE49-F238E27FC236}">
-                <a16:creationId xmlns:a16="http://schemas.microsoft.com/office/drawing/2014/main" id="{DB418ED3-8808-069C-BB41-76242F724929}"/>
+                <a16:creationId xmlns:a16="http://schemas.microsoft.com/office/drawing/2014/main" id="{35356223-BDCA-54F6-46AB-9BD8AFB4E3D4}"/>
               </a:ext>
             </a:extLst>
           </p:cNvPr>
@@ -6693,80 +6801,6 @@
           <a:chExt cx="0" cy="0"/>
         </a:xfrm>
       </p:grpSpPr>
-      <p:sp>
-        <p:nvSpPr>
-          <p:cNvPr id="2" name="Title 1"/>
-          <p:cNvSpPr>
-            <a:spLocks noGrp="1"/>
-          </p:cNvSpPr>
-          <p:nvPr>
-            <p:ph type="title"/>
-          </p:nvPr>
-        </p:nvSpPr>
-        <p:spPr/>
-        <p:txBody>
-          <a:bodyPr/>
-          <a:lstStyle/>
-          <a:p>
-            <a:pPr marL="0" lvl="0" indent="0">
-              <a:buNone/>
-            </a:pPr>
-            <a:r>
-              <a:t>Designing Data-Intensive Applications</a:t>
-            </a:r>
-          </a:p>
-        </p:txBody>
-      </p:sp>
-      <p:sp>
-        <p:nvSpPr>
-          <p:cNvPr id="3" name="Content Placeholder 2"/>
-          <p:cNvSpPr>
-            <a:spLocks noGrp="1"/>
-          </p:cNvSpPr>
-          <p:nvPr>
-            <p:ph sz="half" idx="1"/>
-          </p:nvPr>
-        </p:nvSpPr>
-        <p:spPr/>
-        <p:txBody>
-          <a:bodyPr>
-            <a:normAutofit fontScale="92500" lnSpcReduction="20000"/>
-          </a:bodyPr>
-          <a:lstStyle/>
-          <a:p>
-            <a:pPr lvl="0"/>
-            <a:r>
-              <a:t>Many applications today are data-intensive instead of compute-intensive.</a:t>
-            </a:r>
-          </a:p>
-          <a:p>
-            <a:pPr lvl="1"/>
-            <a:r>
-              <a:t>The limit factor is data and not computation.</a:t>
-            </a:r>
-          </a:p>
-          <a:p>
-            <a:pPr lvl="1"/>
-            <a:r>
-              <a:t>Concerns: the amount of data, complexity of data, and speed at which it changes.</a:t>
-            </a:r>
-          </a:p>
-          <a:p>
-            <a:pPr lvl="0"/>
-            <a:r>
-              <a:t>ML Systems tend to be embedded in data-intensive applications.</a:t>
-            </a:r>
-          </a:p>
-          <a:p>
-            <a:pPr marL="0" lvl="0" indent="0">
-              <a:buNone/>
-            </a:pPr>
-            <a:r>
-              <a:t>(Kleppmann, 2017)</a:t>
-            </a:r>
-          </a:p>
-        </p:txBody>
-      </p:sp>
       <p:pic>
         <p:nvPicPr>
           <p:cNvPr id="4" name="Picture 1" descr="./img/data_intensive_products.png"/>
@@ -6783,8 +6817,8 @@
         </p:blipFill>
         <p:spPr bwMode="auto">
           <a:xfrm>
-            <a:off x="7099300" y="1993900"/>
-            <a:ext cx="2476500" cy="3251200"/>
+            <a:off x="5907882" y="499533"/>
+            <a:ext cx="4697720" cy="6167264"/>
           </a:xfrm>
           <a:prstGeom prst="rect">
             <a:avLst/>
@@ -6799,13 +6833,108 @@
       </p:pic>
       <p:sp>
         <p:nvSpPr>
+          <p:cNvPr id="2" name="Title 1"/>
+          <p:cNvSpPr>
+            <a:spLocks noGrp="1"/>
+          </p:cNvSpPr>
+          <p:nvPr>
+            <p:ph type="title"/>
+          </p:nvPr>
+        </p:nvSpPr>
+        <p:spPr/>
+        <p:txBody>
+          <a:bodyPr/>
+          <a:lstStyle/>
+          <a:p>
+            <a:pPr marL="0" lvl="0" indent="0">
+              <a:buNone/>
+            </a:pPr>
+            <a:r>
+              <a:rPr dirty="0"/>
+              <a:t>Designing Data-Intensive </a:t>
+            </a:r>
+            <a:br>
+              <a:rPr lang="en-US" dirty="0"/>
+            </a:br>
+            <a:r>
+              <a:rPr dirty="0"/>
+              <a:t>Applications</a:t>
+            </a:r>
+          </a:p>
+        </p:txBody>
+      </p:sp>
+      <p:sp>
+        <p:nvSpPr>
+          <p:cNvPr id="3" name="Content Placeholder 2"/>
+          <p:cNvSpPr>
+            <a:spLocks noGrp="1"/>
+          </p:cNvSpPr>
+          <p:nvPr>
+            <p:ph sz="half" idx="1"/>
+          </p:nvPr>
+        </p:nvSpPr>
+        <p:spPr/>
+        <p:txBody>
+          <a:bodyPr>
+            <a:normAutofit fontScale="92500" lnSpcReduction="10000"/>
+          </a:bodyPr>
+          <a:lstStyle/>
+          <a:p>
+            <a:pPr lvl="0"/>
+            <a:r>
+              <a:rPr dirty="0"/>
+              <a:t>Many applications today are data-intensive instead of compute-intensive.</a:t>
+            </a:r>
+          </a:p>
+          <a:p>
+            <a:pPr lvl="1"/>
+            <a:r>
+              <a:rPr dirty="0"/>
+              <a:t>The limit factor is data and not computation.</a:t>
+            </a:r>
+          </a:p>
+          <a:p>
+            <a:pPr lvl="1"/>
+            <a:r>
+              <a:rPr dirty="0"/>
+              <a:t>Concerns: the amount of data, complexity of data, and speed at which it changes.</a:t>
+            </a:r>
+          </a:p>
+          <a:p>
+            <a:pPr lvl="0"/>
+            <a:r>
+              <a:rPr dirty="0"/>
+              <a:t>ML Systems tend to be embedded in data-intensive applications.</a:t>
+            </a:r>
+          </a:p>
+          <a:p>
+            <a:pPr marL="0" lvl="0" indent="0" algn="r">
+              <a:buNone/>
+            </a:pPr>
+            <a:r>
+              <a:rPr sz="1200" dirty="0"/>
+              <a:t>(</a:t>
+            </a:r>
+            <a:r>
+              <a:rPr sz="1200" dirty="0" err="1"/>
+              <a:t>Kleppmann</a:t>
+            </a:r>
+            <a:r>
+              <a:rPr sz="1200" dirty="0"/>
+              <a:t>, 2017)</a:t>
+            </a:r>
+          </a:p>
+        </p:txBody>
+      </p:sp>
+      <p:sp>
+        <p:nvSpPr>
           <p:cNvPr id="5" name="TextBox 3"/>
           <p:cNvSpPr txBox="1"/>
           <p:nvPr/>
         </p:nvSpPr>
         <p:spPr>
           <a:xfrm>
-            <a:off x="6007100" y="5245100"/>
+            <a:off x="8590741" y="5765462"/>
             <a:ext cx="4660900" cy="508000"/>
           </a:xfrm>
           <a:prstGeom prst="rect">
@@ -6821,7 +6950,16 @@
               <a:buNone/>
             </a:pPr>
             <a:r>
-              <a:t>(Kleppmann, 2017)</a:t>
+              <a:rPr sz="1100" dirty="0"/>
+              <a:t>(</a:t>
+            </a:r>
+            <a:r>
+              <a:rPr sz="1100" dirty="0" err="1"/>
+              <a:t>Kleppmann</a:t>
+            </a:r>
+            <a:r>
+              <a:rPr sz="1100" dirty="0"/>
+              <a:t>, 2017)</a:t>
             </a:r>
           </a:p>
         </p:txBody>
@@ -6831,7 +6969,7 @@
           <p:cNvPr id="6" name="Date Placeholder 5">
             <a:extLst>
               <a:ext uri="{FF2B5EF4-FFF2-40B4-BE49-F238E27FC236}">
-                <a16:creationId xmlns:a16="http://schemas.microsoft.com/office/drawing/2014/main" id="{C4A2DC7C-C50F-34E9-2D77-90EF52C83078}"/>
+                <a16:creationId xmlns:a16="http://schemas.microsoft.com/office/drawing/2014/main" id="{E97D089C-E2D0-0767-18D4-2BF3A24532F0}"/>
               </a:ext>
             </a:extLst>
           </p:cNvPr>
@@ -6848,10 +6986,9 @@
           <a:lstStyle/>
           <a:p>
             <a:r>
-              <a:rPr lang="en-US"/>
+              <a:rPr lang="en-CA"/>
               <a:t>February 2024</a:t>
             </a:r>
-            <a:endParaRPr lang="en-CA"/>
           </a:p>
         </p:txBody>
       </p:sp>
@@ -6860,7 +6997,7 @@
           <p:cNvPr id="7" name="Footer Placeholder 6">
             <a:extLst>
               <a:ext uri="{FF2B5EF4-FFF2-40B4-BE49-F238E27FC236}">
-                <a16:creationId xmlns:a16="http://schemas.microsoft.com/office/drawing/2014/main" id="{10FEF946-A4FB-ACA4-AA76-A1F51B0ACA13}"/>
+                <a16:creationId xmlns:a16="http://schemas.microsoft.com/office/drawing/2014/main" id="{F4FB89CC-913E-A213-9A10-29F01F38B8C1}"/>
               </a:ext>
             </a:extLst>
           </p:cNvPr>
@@ -6878,7 +7015,7 @@
           <a:p>
             <a:r>
               <a:rPr lang="en-US"/>
-              <a:t>Production 1 - Introduction to ML Systems</a:t>
+              <a:t>Production 1: Introduction to ML Systems</a:t>
             </a:r>
             <a:endParaRPr lang="en-CA"/>
           </a:p>
@@ -6889,7 +7026,7 @@
           <p:cNvPr id="8" name="Slide Number Placeholder 7">
             <a:extLst>
               <a:ext uri="{FF2B5EF4-FFF2-40B4-BE49-F238E27FC236}">
-                <a16:creationId xmlns:a16="http://schemas.microsoft.com/office/drawing/2014/main" id="{FBAF85F0-ABFC-A3E1-6AC4-3997F6BC355F}"/>
+                <a16:creationId xmlns:a16="http://schemas.microsoft.com/office/drawing/2014/main" id="{39BA68A0-477F-F145-44FF-7445D3983292}"/>
               </a:ext>
             </a:extLst>
           </p:cNvPr>
@@ -7103,7 +7240,7 @@
           <p:cNvPr id="5" name="Date Placeholder 4">
             <a:extLst>
               <a:ext uri="{FF2B5EF4-FFF2-40B4-BE49-F238E27FC236}">
-                <a16:creationId xmlns:a16="http://schemas.microsoft.com/office/drawing/2014/main" id="{370FB95F-4823-BEE2-714D-B45D6855BCAC}"/>
+                <a16:creationId xmlns:a16="http://schemas.microsoft.com/office/drawing/2014/main" id="{1C541646-AC1B-BA79-0287-6E5070663EC7}"/>
               </a:ext>
             </a:extLst>
           </p:cNvPr>
@@ -7120,10 +7257,9 @@
           <a:lstStyle/>
           <a:p>
             <a:r>
-              <a:rPr lang="en-US"/>
+              <a:rPr lang="en-CA"/>
               <a:t>February 2024</a:t>
             </a:r>
-            <a:endParaRPr lang="en-CA"/>
           </a:p>
         </p:txBody>
       </p:sp>
@@ -7132,7 +7268,7 @@
           <p:cNvPr id="6" name="Footer Placeholder 5">
             <a:extLst>
               <a:ext uri="{FF2B5EF4-FFF2-40B4-BE49-F238E27FC236}">
-                <a16:creationId xmlns:a16="http://schemas.microsoft.com/office/drawing/2014/main" id="{274ED35B-D642-DD55-6793-064D023FA549}"/>
+                <a16:creationId xmlns:a16="http://schemas.microsoft.com/office/drawing/2014/main" id="{C2F53E5D-FC34-1099-3025-4C13F279227C}"/>
               </a:ext>
             </a:extLst>
           </p:cNvPr>
@@ -7150,7 +7286,7 @@
           <a:p>
             <a:r>
               <a:rPr lang="en-US"/>
-              <a:t>Production 1 - Introduction to ML Systems</a:t>
+              <a:t>Production 1: Introduction to ML Systems</a:t>
             </a:r>
             <a:endParaRPr lang="en-CA"/>
           </a:p>
@@ -7161,7 +7297,7 @@
           <p:cNvPr id="7" name="Slide Number Placeholder 6">
             <a:extLst>
               <a:ext uri="{FF2B5EF4-FFF2-40B4-BE49-F238E27FC236}">
-                <a16:creationId xmlns:a16="http://schemas.microsoft.com/office/drawing/2014/main" id="{B255054D-9BCD-697C-819E-8DAC248DA89E}"/>
+                <a16:creationId xmlns:a16="http://schemas.microsoft.com/office/drawing/2014/main" id="{B24171A9-C7B9-3787-FB5E-0C8DC987BC56}"/>
               </a:ext>
             </a:extLst>
           </p:cNvPr>
@@ -7244,7 +7380,7 @@
           <p:cNvPr id="3" name="Date Placeholder 2">
             <a:extLst>
               <a:ext uri="{FF2B5EF4-FFF2-40B4-BE49-F238E27FC236}">
-                <a16:creationId xmlns:a16="http://schemas.microsoft.com/office/drawing/2014/main" id="{350ED634-9E69-78CD-E3CE-3DAE10C4DC10}"/>
+                <a16:creationId xmlns:a16="http://schemas.microsoft.com/office/drawing/2014/main" id="{0A60AAE0-7AED-AD53-1A37-CF8E84CCBD84}"/>
               </a:ext>
             </a:extLst>
           </p:cNvPr>
@@ -7261,10 +7397,9 @@
           <a:lstStyle/>
           <a:p>
             <a:r>
-              <a:rPr lang="en-US"/>
+              <a:rPr lang="en-CA"/>
               <a:t>February 2024</a:t>
             </a:r>
-            <a:endParaRPr lang="en-CA"/>
           </a:p>
         </p:txBody>
       </p:sp>
@@ -7273,7 +7408,7 @@
           <p:cNvPr id="4" name="Footer Placeholder 3">
             <a:extLst>
               <a:ext uri="{FF2B5EF4-FFF2-40B4-BE49-F238E27FC236}">
-                <a16:creationId xmlns:a16="http://schemas.microsoft.com/office/drawing/2014/main" id="{66890973-2434-0C6F-70A7-77520CE86D8F}"/>
+                <a16:creationId xmlns:a16="http://schemas.microsoft.com/office/drawing/2014/main" id="{DA32BDAB-4C1B-946A-A41C-D3B8D745D99D}"/>
               </a:ext>
             </a:extLst>
           </p:cNvPr>
@@ -7291,7 +7426,7 @@
           <a:p>
             <a:r>
               <a:rPr lang="en-US"/>
-              <a:t>Production 1 - Introduction to ML Systems</a:t>
+              <a:t>Production 1: Introduction to ML Systems</a:t>
             </a:r>
             <a:endParaRPr lang="en-CA"/>
           </a:p>
@@ -7302,7 +7437,7 @@
           <p:cNvPr id="5" name="Slide Number Placeholder 4">
             <a:extLst>
               <a:ext uri="{FF2B5EF4-FFF2-40B4-BE49-F238E27FC236}">
-                <a16:creationId xmlns:a16="http://schemas.microsoft.com/office/drawing/2014/main" id="{71FE4FD2-02CF-72C1-A712-43D504572AAF}"/>
+                <a16:creationId xmlns:a16="http://schemas.microsoft.com/office/drawing/2014/main" id="{B59050FC-7DD6-779E-005B-7E440831DEED}"/>
               </a:ext>
             </a:extLst>
           </p:cNvPr>
@@ -7429,7 +7564,16 @@
               <a:buNone/>
             </a:pPr>
             <a:r>
-              <a:t>(Huyen, 2022)</a:t>
+              <a:rPr sz="1100" dirty="0"/>
+              <a:t>(</a:t>
+            </a:r>
+            <a:r>
+              <a:rPr sz="1100" dirty="0" err="1"/>
+              <a:t>Huyen</a:t>
+            </a:r>
+            <a:r>
+              <a:rPr sz="1100" dirty="0"/>
+              <a:t>, 2022)</a:t>
             </a:r>
           </a:p>
         </p:txBody>
@@ -7488,15 +7632,17 @@
               <a:buNone/>
             </a:pPr>
             <a:r>
+              <a:rPr sz="1100"/>
               <a:t>CRISP-DM (c. 1999): have things changed that much? (</a:t>
             </a:r>
             <a:r>
-              <a:rPr>
+              <a:rPr sz="1100">
                 <a:hlinkClick r:id="rId4"/>
               </a:rPr>
               <a:t>source</a:t>
             </a:r>
             <a:r>
+              <a:rPr sz="1100"/>
               <a:t>)</a:t>
             </a:r>
           </a:p>
@@ -7507,7 +7653,7 @@
           <p:cNvPr id="7" name="Date Placeholder 6">
             <a:extLst>
               <a:ext uri="{FF2B5EF4-FFF2-40B4-BE49-F238E27FC236}">
-                <a16:creationId xmlns:a16="http://schemas.microsoft.com/office/drawing/2014/main" id="{2001CE9D-CF86-E672-7314-3848202077DA}"/>
+                <a16:creationId xmlns:a16="http://schemas.microsoft.com/office/drawing/2014/main" id="{A5D6D506-8AC6-1053-1156-DEDAA1A0E488}"/>
               </a:ext>
             </a:extLst>
           </p:cNvPr>
@@ -7524,10 +7670,9 @@
           <a:lstStyle/>
           <a:p>
             <a:r>
-              <a:rPr lang="en-US"/>
+              <a:rPr lang="en-CA"/>
               <a:t>February 2024</a:t>
             </a:r>
-            <a:endParaRPr lang="en-CA"/>
           </a:p>
         </p:txBody>
       </p:sp>
@@ -7536,7 +7681,7 @@
           <p:cNvPr id="8" name="Footer Placeholder 7">
             <a:extLst>
               <a:ext uri="{FF2B5EF4-FFF2-40B4-BE49-F238E27FC236}">
-                <a16:creationId xmlns:a16="http://schemas.microsoft.com/office/drawing/2014/main" id="{F70806B4-9FC9-1035-4BA8-5C14249BB767}"/>
+                <a16:creationId xmlns:a16="http://schemas.microsoft.com/office/drawing/2014/main" id="{675506BE-C82A-32BE-E337-8C18C033F166}"/>
               </a:ext>
             </a:extLst>
           </p:cNvPr>
@@ -7554,7 +7699,7 @@
           <a:p>
             <a:r>
               <a:rPr lang="en-US"/>
-              <a:t>Production 1 - Introduction to ML Systems</a:t>
+              <a:t>Production 1: Introduction to ML Systems</a:t>
             </a:r>
             <a:endParaRPr lang="en-CA"/>
           </a:p>
@@ -7565,7 +7710,7 @@
           <p:cNvPr id="9" name="Slide Number Placeholder 8">
             <a:extLst>
               <a:ext uri="{FF2B5EF4-FFF2-40B4-BE49-F238E27FC236}">
-                <a16:creationId xmlns:a16="http://schemas.microsoft.com/office/drawing/2014/main" id="{EB9F6DBE-8BB0-FC62-D7D6-298B2FE924DB}"/>
+                <a16:creationId xmlns:a16="http://schemas.microsoft.com/office/drawing/2014/main" id="{3CC33162-3E19-09FC-FCCD-F0A42C7F01C5}"/>
               </a:ext>
             </a:extLst>
           </p:cNvPr>
@@ -7651,7 +7796,7 @@
         <p:spPr/>
         <p:txBody>
           <a:bodyPr>
-            <a:normAutofit fontScale="62500" lnSpcReduction="20000"/>
+            <a:normAutofit fontScale="77500" lnSpcReduction="20000"/>
           </a:bodyPr>
           <a:lstStyle/>
           <a:p>
@@ -7708,81 +7853,98 @@
             <p:ph sz="half" idx="2"/>
           </p:nvPr>
         </p:nvSpPr>
-        <p:spPr/>
+        <p:spPr>
+          <a:xfrm>
+            <a:off x="6011330" y="767114"/>
+            <a:ext cx="4663440" cy="4998348"/>
+          </a:xfrm>
+        </p:spPr>
         <p:txBody>
           <a:bodyPr>
-            <a:normAutofit fontScale="62500" lnSpcReduction="20000"/>
+            <a:normAutofit fontScale="77500" lnSpcReduction="20000"/>
           </a:bodyPr>
           <a:lstStyle/>
           <a:p>
             <a:pPr lvl="0"/>
             <a:r>
+              <a:rPr dirty="0"/>
               <a:t>Classification tasks are:</a:t>
             </a:r>
           </a:p>
           <a:p>
             <a:pPr lvl="1"/>
             <a:r>
+              <a:rPr dirty="0"/>
               <a:t>Binary:</a:t>
             </a:r>
           </a:p>
           <a:p>
             <a:pPr lvl="2"/>
             <a:r>
+              <a:rPr dirty="0"/>
               <a:t>Two classes.</a:t>
             </a:r>
           </a:p>
           <a:p>
             <a:pPr lvl="2"/>
             <a:r>
+              <a:rPr dirty="0"/>
               <a:t>Simplest classification problems</a:t>
             </a:r>
           </a:p>
           <a:p>
             <a:pPr lvl="1"/>
             <a:r>
+              <a:rPr dirty="0"/>
               <a:t>Multiclass:</a:t>
             </a:r>
           </a:p>
           <a:p>
             <a:pPr lvl="2"/>
             <a:r>
+              <a:rPr dirty="0"/>
               <a:t>More than two (mutually exclusive) classes.</a:t>
             </a:r>
           </a:p>
           <a:p>
             <a:pPr lvl="2"/>
             <a:r>
+              <a:rPr dirty="0"/>
               <a:t>High cardinality (number of classes) problems will be more complex than low cardinality problems.</a:t>
             </a:r>
           </a:p>
           <a:p>
             <a:pPr lvl="2"/>
             <a:r>
+              <a:rPr dirty="0"/>
               <a:t>High cardinality can be addressed with a hierarchical classification approach: first, classify into large groups, then classify into specific labels.</a:t>
             </a:r>
           </a:p>
           <a:p>
             <a:pPr lvl="1"/>
             <a:r>
+              <a:rPr dirty="0"/>
               <a:t>Multilabel:</a:t>
             </a:r>
           </a:p>
           <a:p>
             <a:pPr lvl="2"/>
             <a:r>
+              <a:rPr dirty="0"/>
               <a:t>An observation can have more than one label.</a:t>
             </a:r>
           </a:p>
           <a:p>
             <a:pPr lvl="2"/>
             <a:r>
+              <a:rPr dirty="0"/>
               <a:t>One approach is to treat the problem as multiclass by creating unique labels out of combinations of individual labels.</a:t>
             </a:r>
           </a:p>
           <a:p>
             <a:pPr lvl="2"/>
             <a:r>
+              <a:rPr dirty="0"/>
               <a:t>Another approach is one-vs-rest, where each label is treated with a different binary classification model.</a:t>
             </a:r>
           </a:p>
@@ -7793,7 +7955,7 @@
           <p:cNvPr id="5" name="Date Placeholder 4">
             <a:extLst>
               <a:ext uri="{FF2B5EF4-FFF2-40B4-BE49-F238E27FC236}">
-                <a16:creationId xmlns:a16="http://schemas.microsoft.com/office/drawing/2014/main" id="{C818393F-0657-40D0-32C5-694274E9049D}"/>
+                <a16:creationId xmlns:a16="http://schemas.microsoft.com/office/drawing/2014/main" id="{7775EED4-78FA-2395-520C-3268B2CF73C5}"/>
               </a:ext>
             </a:extLst>
           </p:cNvPr>
@@ -7810,10 +7972,9 @@
           <a:lstStyle/>
           <a:p>
             <a:r>
-              <a:rPr lang="en-US"/>
+              <a:rPr lang="en-CA"/>
               <a:t>February 2024</a:t>
             </a:r>
-            <a:endParaRPr lang="en-CA"/>
           </a:p>
         </p:txBody>
       </p:sp>
@@ -7822,7 +7983,7 @@
           <p:cNvPr id="6" name="Footer Placeholder 5">
             <a:extLst>
               <a:ext uri="{FF2B5EF4-FFF2-40B4-BE49-F238E27FC236}">
-                <a16:creationId xmlns:a16="http://schemas.microsoft.com/office/drawing/2014/main" id="{1823653C-7F6E-B78F-3C0F-405FBB05E758}"/>
+                <a16:creationId xmlns:a16="http://schemas.microsoft.com/office/drawing/2014/main" id="{EED5D1B8-CC12-2D7C-0FE7-42621EA6A67F}"/>
               </a:ext>
             </a:extLst>
           </p:cNvPr>
@@ -7840,7 +8001,7 @@
           <a:p>
             <a:r>
               <a:rPr lang="en-US"/>
-              <a:t>Production 1 - Introduction to ML Systems</a:t>
+              <a:t>Production 1: Introduction to ML Systems</a:t>
             </a:r>
             <a:endParaRPr lang="en-CA"/>
           </a:p>
@@ -7851,7 +8012,7 @@
           <p:cNvPr id="7" name="Slide Number Placeholder 6">
             <a:extLst>
               <a:ext uri="{FF2B5EF4-FFF2-40B4-BE49-F238E27FC236}">
-                <a16:creationId xmlns:a16="http://schemas.microsoft.com/office/drawing/2014/main" id="{A1E4ED17-E574-7D4D-09F2-95F4BBC516D9}"/>
+                <a16:creationId xmlns:a16="http://schemas.microsoft.com/office/drawing/2014/main" id="{9A3E24AD-9ABE-688D-FE27-1DE4ABDDEC99}"/>
               </a:ext>
             </a:extLst>
           </p:cNvPr>
@@ -7924,8 +8085,8 @@
           </a:p>
         </p:txBody>
       </p:sp>
-      <mc:AlternateContent xmlns:mc="http://schemas.openxmlformats.org/markup-compatibility/2006" xmlns:a14="http://schemas.microsoft.com/office/drawing/2010/main">
-        <mc:Choice Requires="a14">
+      <mc:AlternateContent xmlns:mc="http://schemas.openxmlformats.org/markup-compatibility/2006">
+        <mc:Choice xmlns:a14="http://schemas.microsoft.com/office/drawing/2010/main" Requires="a14">
           <p:sp>
             <p:nvSpPr>
               <p:cNvPr id="3" name="Content Placeholder 2"/>
@@ -7936,45 +8097,56 @@
                 <p:ph sz="half" idx="1"/>
               </p:nvPr>
             </p:nvSpPr>
-            <p:spPr/>
+            <p:spPr>
+              <a:xfrm>
+                <a:off x="676656" y="1998133"/>
+                <a:ext cx="4663440" cy="4414313"/>
+              </a:xfrm>
+            </p:spPr>
             <p:txBody>
               <a:bodyPr>
-                <a:normAutofit fontScale="47500" lnSpcReduction="20000"/>
+                <a:normAutofit lnSpcReduction="10000"/>
               </a:bodyPr>
               <a:lstStyle/>
               <a:p>
                 <a:pPr lvl="0"/>
                 <a:r>
+                  <a:rPr sz="1400" dirty="0"/>
                   <a:t>ML requires an objective function to guide the learning process through optimization.</a:t>
                 </a:r>
               </a:p>
               <a:p>
                 <a:pPr lvl="0"/>
                 <a:r>
+                  <a:rPr sz="1400" dirty="0"/>
                   <a:t>In the context of ML:</a:t>
                 </a:r>
               </a:p>
               <a:p>
                 <a:pPr lvl="1"/>
                 <a:r>
+                  <a:rPr sz="1200" dirty="0"/>
                   <a:t>Regression tasks generally employ error or accuracy metrics: Root Mean Square Error (RMSE) or Mean Absolute Error (MAE).</a:t>
                 </a:r>
               </a:p>
               <a:p>
                 <a:pPr lvl="1"/>
                 <a:r>
+                  <a:rPr sz="1200" dirty="0"/>
                   <a:t>Classification tasks are generally performed using log loss or cross-entropy.</a:t>
                 </a:r>
               </a:p>
               <a:p>
                 <a:pPr lvl="0"/>
                 <a:r>
+                  <a:rPr sz="1400" dirty="0"/>
                   <a:t>Log or cross-entropy loss is a performance metric that quantifies the difference between predicted and actual probabilities.</a:t>
                 </a:r>
               </a:p>
               <a:p>
                 <a:pPr lvl="0"/>
                 <a:r>
+                  <a:rPr sz="1400" dirty="0"/>
                   <a:t>In a two-class setting, it is given by:</a:t>
                 </a:r>
               </a:p>
@@ -7989,7 +8161,7 @@
                     </m:oMathParaPr>
                     <m:oMath xmlns:m="http://schemas.openxmlformats.org/officeDocument/2006/math">
                       <m:r>
-                        <a:rPr>
+                        <a:rPr sz="1400">
                           <a:latin typeface="Cambria Math" panose="02040503050406030204" pitchFamily="18" charset="0"/>
                         </a:rPr>
                         <m:t>𝐻</m:t>
@@ -7997,26 +8169,26 @@
                       <m:d>
                         <m:dPr>
                           <m:ctrlPr>
-                            <a:rPr i="1">
+                            <a:rPr sz="1400" i="1">
                               <a:latin typeface="Cambria Math" panose="02040503050406030204" pitchFamily="18" charset="0"/>
                             </a:rPr>
                           </m:ctrlPr>
                         </m:dPr>
                         <m:e>
                           <m:r>
-                            <a:rPr>
+                            <a:rPr sz="1400">
                               <a:latin typeface="Cambria Math" panose="02040503050406030204" pitchFamily="18" charset="0"/>
                             </a:rPr>
                             <m:t>𝑝</m:t>
                           </m:r>
                           <m:r>
-                            <a:rPr>
+                            <a:rPr sz="1400">
                               <a:latin typeface="Cambria Math" panose="02040503050406030204" pitchFamily="18" charset="0"/>
                             </a:rPr>
                             <m:t>,</m:t>
                           </m:r>
                           <m:r>
-                            <a:rPr>
+                            <a:rPr sz="1400">
                               <a:latin typeface="Cambria Math" panose="02040503050406030204" pitchFamily="18" charset="0"/>
                             </a:rPr>
                             <m:t>𝑞</m:t>
@@ -8024,7 +8196,7 @@
                         </m:e>
                       </m:d>
                       <m:r>
-                        <a:rPr>
+                        <a:rPr sz="1400">
                           <a:latin typeface="Cambria Math" panose="02040503050406030204" pitchFamily="18" charset="0"/>
                         </a:rPr>
                         <m:t>=−</m:t>
@@ -8034,20 +8206,20 @@
                           <m:chr m:val="∑"/>
                           <m:limLoc m:val="undOvr"/>
                           <m:ctrlPr>
-                            <a:rPr i="1">
+                            <a:rPr sz="1400" i="1">
                               <a:latin typeface="Cambria Math" panose="02040503050406030204" pitchFamily="18" charset="0"/>
                             </a:rPr>
                           </m:ctrlPr>
                         </m:naryPr>
                         <m:sub>
                           <m:r>
-                            <a:rPr>
+                            <a:rPr sz="1400">
                               <a:latin typeface="Cambria Math" panose="02040503050406030204" pitchFamily="18" charset="0"/>
                             </a:rPr>
                             <m:t>𝑖</m:t>
                           </m:r>
                           <m:r>
-                            <a:rPr>
+                            <a:rPr sz="1400">
                               <a:latin typeface="Cambria Math" panose="02040503050406030204" pitchFamily="18" charset="0"/>
                             </a:rPr>
                             <m:t>=1</m:t>
@@ -8055,7 +8227,7 @@
                         </m:sub>
                         <m:sup>
                           <m:r>
-                            <a:rPr>
+                            <a:rPr sz="1400">
                               <a:latin typeface="Cambria Math" panose="02040503050406030204" pitchFamily="18" charset="0"/>
                             </a:rPr>
                             <m:t>𝑛</m:t>
@@ -8065,7 +8237,7 @@
                           <m:d>
                             <m:dPr>
                               <m:ctrlPr>
-                                <a:rPr i="1">
+                                <a:rPr sz="1400" i="1">
                                   <a:latin typeface="Cambria Math" panose="02040503050406030204" pitchFamily="18" charset="0"/>
                                 </a:rPr>
                               </m:ctrlPr>
@@ -8074,14 +8246,14 @@
                               <m:sSub>
                                 <m:sSubPr>
                                   <m:ctrlPr>
-                                    <a:rPr i="1">
+                                    <a:rPr sz="1400" i="1">
                                       <a:latin typeface="Cambria Math" panose="02040503050406030204" pitchFamily="18" charset="0"/>
                                     </a:rPr>
                                   </m:ctrlPr>
                                 </m:sSubPr>
                                 <m:e>
                                   <m:r>
-                                    <a:rPr>
+                                    <a:rPr sz="1400">
                                       <a:latin typeface="Cambria Math" panose="02040503050406030204" pitchFamily="18" charset="0"/>
                                     </a:rPr>
                                     <m:t>𝑦</m:t>
@@ -8089,7 +8261,7 @@
                                 </m:e>
                                 <m:sub>
                                   <m:r>
-                                    <a:rPr>
+                                    <a:rPr sz="1400">
                                       <a:latin typeface="Cambria Math" panose="02040503050406030204" pitchFamily="18" charset="0"/>
                                     </a:rPr>
                                     <m:t>𝑖</m:t>
@@ -8097,7 +8269,7 @@
                                 </m:sub>
                               </m:sSub>
                               <m:r>
-                                <a:rPr>
+                                <a:rPr sz="1400">
                                   <a:latin typeface="Cambria Math" panose="02040503050406030204" pitchFamily="18" charset="0"/>
                                 </a:rPr>
                                 <m:t>𝑙𝑜𝑔</m:t>
@@ -8105,7 +8277,7 @@
                               <m:d>
                                 <m:dPr>
                                   <m:ctrlPr>
-                                    <a:rPr i="1">
+                                    <a:rPr sz="1400" i="1">
                                       <a:latin typeface="Cambria Math" panose="02040503050406030204" pitchFamily="18" charset="0"/>
                                     </a:rPr>
                                   </m:ctrlPr>
@@ -8114,7 +8286,7 @@
                                   <m:sSub>
                                     <m:sSubPr>
                                       <m:ctrlPr>
-                                        <a:rPr i="1">
+                                        <a:rPr sz="1400" i="1">
                                           <a:latin typeface="Cambria Math" panose="02040503050406030204" pitchFamily="18" charset="0"/>
                                         </a:rPr>
                                       </m:ctrlPr>
@@ -8124,14 +8296,14 @@
                                         <m:accPr>
                                           <m:chr m:val="̂"/>
                                           <m:ctrlPr>
-                                            <a:rPr i="1">
+                                            <a:rPr sz="1400" i="1">
                                               <a:latin typeface="Cambria Math" panose="02040503050406030204" pitchFamily="18" charset="0"/>
                                             </a:rPr>
                                           </m:ctrlPr>
                                         </m:accPr>
                                         <m:e>
                                           <m:r>
-                                            <a:rPr>
+                                            <a:rPr sz="1400">
                                               <a:latin typeface="Cambria Math" panose="02040503050406030204" pitchFamily="18" charset="0"/>
                                             </a:rPr>
                                             <m:t>𝑦</m:t>
@@ -8141,19 +8313,19 @@
                                     </m:e>
                                     <m:sub>
                                       <m:r>
-                                        <a:rPr>
+                                        <a:rPr sz="1400">
                                           <a:latin typeface="Cambria Math" panose="02040503050406030204" pitchFamily="18" charset="0"/>
                                         </a:rPr>
                                         <m:t>𝜃</m:t>
                                       </m:r>
                                       <m:r>
-                                        <a:rPr>
+                                        <a:rPr sz="1400">
                                           <a:latin typeface="Cambria Math" panose="02040503050406030204" pitchFamily="18" charset="0"/>
                                         </a:rPr>
                                         <m:t>,</m:t>
                                       </m:r>
                                       <m:r>
-                                        <a:rPr>
+                                        <a:rPr sz="1400">
                                           <a:latin typeface="Cambria Math" panose="02040503050406030204" pitchFamily="18" charset="0"/>
                                         </a:rPr>
                                         <m:t>𝑖</m:t>
@@ -8163,7 +8335,7 @@
                                 </m:e>
                               </m:d>
                               <m:r>
-                                <a:rPr>
+                                <a:rPr sz="1400">
                                   <a:latin typeface="Cambria Math" panose="02040503050406030204" pitchFamily="18" charset="0"/>
                                 </a:rPr>
                                 <m:t>+</m:t>
@@ -8171,14 +8343,14 @@
                               <m:d>
                                 <m:dPr>
                                   <m:ctrlPr>
-                                    <a:rPr i="1">
+                                    <a:rPr sz="1400" i="1">
                                       <a:latin typeface="Cambria Math" panose="02040503050406030204" pitchFamily="18" charset="0"/>
                                     </a:rPr>
                                   </m:ctrlPr>
                                 </m:dPr>
                                 <m:e>
                                   <m:r>
-                                    <a:rPr>
+                                    <a:rPr sz="1400">
                                       <a:latin typeface="Cambria Math" panose="02040503050406030204" pitchFamily="18" charset="0"/>
                                     </a:rPr>
                                     <m:t>1−</m:t>
@@ -8186,14 +8358,14 @@
                                   <m:sSub>
                                     <m:sSubPr>
                                       <m:ctrlPr>
-                                        <a:rPr i="1">
+                                        <a:rPr sz="1400" i="1">
                                           <a:latin typeface="Cambria Math" panose="02040503050406030204" pitchFamily="18" charset="0"/>
                                         </a:rPr>
                                       </m:ctrlPr>
                                     </m:sSubPr>
                                     <m:e>
                                       <m:r>
-                                        <a:rPr>
+                                        <a:rPr sz="1400">
                                           <a:latin typeface="Cambria Math" panose="02040503050406030204" pitchFamily="18" charset="0"/>
                                         </a:rPr>
                                         <m:t>𝑦</m:t>
@@ -8201,7 +8373,7 @@
                                     </m:e>
                                     <m:sub>
                                       <m:r>
-                                        <a:rPr>
+                                        <a:rPr sz="1400">
                                           <a:latin typeface="Cambria Math" panose="02040503050406030204" pitchFamily="18" charset="0"/>
                                         </a:rPr>
                                         <m:t>𝑖</m:t>
@@ -8211,7 +8383,7 @@
                                 </m:e>
                               </m:d>
                               <m:r>
-                                <a:rPr>
+                                <a:rPr sz="1400">
                                   <a:latin typeface="Cambria Math" panose="02040503050406030204" pitchFamily="18" charset="0"/>
                                 </a:rPr>
                                 <m:t>𝑙𝑜𝑔</m:t>
@@ -8219,14 +8391,14 @@
                               <m:d>
                                 <m:dPr>
                                   <m:ctrlPr>
-                                    <a:rPr i="1">
+                                    <a:rPr sz="1400" i="1">
                                       <a:latin typeface="Cambria Math" panose="02040503050406030204" pitchFamily="18" charset="0"/>
                                     </a:rPr>
                                   </m:ctrlPr>
                                 </m:dPr>
                                 <m:e>
                                   <m:r>
-                                    <a:rPr>
+                                    <a:rPr sz="1400">
                                       <a:latin typeface="Cambria Math" panose="02040503050406030204" pitchFamily="18" charset="0"/>
                                     </a:rPr>
                                     <m:t>1−</m:t>
@@ -8234,7 +8406,7 @@
                                   <m:sSub>
                                     <m:sSubPr>
                                       <m:ctrlPr>
-                                        <a:rPr i="1">
+                                        <a:rPr sz="1400" i="1">
                                           <a:latin typeface="Cambria Math" panose="02040503050406030204" pitchFamily="18" charset="0"/>
                                         </a:rPr>
                                       </m:ctrlPr>
@@ -8244,14 +8416,14 @@
                                         <m:accPr>
                                           <m:chr m:val="̂"/>
                                           <m:ctrlPr>
-                                            <a:rPr i="1">
+                                            <a:rPr sz="1400" i="1">
                                               <a:latin typeface="Cambria Math" panose="02040503050406030204" pitchFamily="18" charset="0"/>
                                             </a:rPr>
                                           </m:ctrlPr>
                                         </m:accPr>
                                         <m:e>
                                           <m:r>
-                                            <a:rPr>
+                                            <a:rPr sz="1400">
                                               <a:latin typeface="Cambria Math" panose="02040503050406030204" pitchFamily="18" charset="0"/>
                                             </a:rPr>
                                             <m:t>𝑦</m:t>
@@ -8261,19 +8433,19 @@
                                     </m:e>
                                     <m:sub>
                                       <m:r>
-                                        <a:rPr>
+                                        <a:rPr sz="1400">
                                           <a:latin typeface="Cambria Math" panose="02040503050406030204" pitchFamily="18" charset="0"/>
                                         </a:rPr>
                                         <m:t>𝜃</m:t>
                                       </m:r>
                                       <m:r>
-                                        <a:rPr>
+                                        <a:rPr sz="1400">
                                           <a:latin typeface="Cambria Math" panose="02040503050406030204" pitchFamily="18" charset="0"/>
                                         </a:rPr>
                                         <m:t>,</m:t>
                                       </m:r>
                                       <m:r>
-                                        <a:rPr>
+                                        <a:rPr sz="1400">
                                           <a:latin typeface="Cambria Math" panose="02040503050406030204" pitchFamily="18" charset="0"/>
                                         </a:rPr>
                                         <m:t>𝑖</m:t>
@@ -8289,18 +8461,19 @@
                     </m:oMath>
                   </m:oMathPara>
                 </a14:m>
-                <a:endParaRPr/>
+                <a:endParaRPr sz="1400" dirty="0"/>
               </a:p>
               <a:p>
                 <a:pPr lvl="0"/>
                 <a:r>
+                  <a:rPr sz="1400" dirty="0"/>
                   <a:t>Formulation is related to maximum likelihood: minimizing negative log-likelihood is the “same” as minimizing log loss.</a:t>
                 </a:r>
               </a:p>
             </p:txBody>
           </p:sp>
         </mc:Choice>
-        <mc:Fallback xmlns="">
+        <mc:Fallback>
           <p:sp>
             <p:nvSpPr>
               <p:cNvPr id="3" name="Content Placeholder 2"/>
@@ -8312,10 +8485,14 @@
               </p:nvPr>
             </p:nvSpPr>
             <p:spPr>
+              <a:xfrm>
+                <a:off x="676656" y="1998133"/>
+                <a:ext cx="4663440" cy="4414313"/>
+              </a:xfrm>
               <a:blipFill>
                 <a:blip r:embed="rId2"/>
                 <a:stretch>
-                  <a:fillRect t="-324"/>
+                  <a:fillRect l="-131" t="-276"/>
                 </a:stretch>
               </a:blipFill>
             </p:spPr>
@@ -8347,22 +8524,24 @@
         <p:spPr/>
         <p:txBody>
           <a:bodyPr>
-            <a:normAutofit fontScale="47500" lnSpcReduction="20000"/>
+            <a:normAutofit lnSpcReduction="10000"/>
           </a:bodyPr>
           <a:lstStyle/>
           <a:p>
             <a:pPr lvl="0"/>
             <a:r>
+              <a:rPr sz="1400" dirty="0"/>
               <a:t>Assume the actual value is 1.</a:t>
             </a:r>
           </a:p>
           <a:p>
             <a:pPr lvl="0"/>
             <a:r>
+              <a:rPr sz="1400" dirty="0"/>
               <a:t>If the model is confident and correctly predicted 0.9, then </a:t>
             </a:r>
             <a:r>
-              <a:rPr>
+              <a:rPr sz="1400" dirty="0">
                 <a:latin typeface="Courier"/>
               </a:rPr>
               <a:t>Loss = -(1*log(0.9)) = 0.10536</a:t>
@@ -8371,25 +8550,31 @@
           <a:p>
             <a:pPr lvl="0"/>
             <a:r>
+              <a:rPr sz="1400" dirty="0"/>
               <a:t>If the model is unsure and predicted 0.5, then </a:t>
             </a:r>
-            <a:r>
-              <a:rPr>
+            <a:br>
+              <a:rPr lang="en-US" sz="1400" dirty="0"/>
+            </a:br>
+            <a:r>
+              <a:rPr sz="1400" dirty="0">
                 <a:latin typeface="Courier"/>
               </a:rPr>
               <a:t>Loss = -(1*log(0.5)) = 0.6931</a:t>
             </a:r>
             <a:r>
+              <a:rPr sz="1400" dirty="0"/>
               <a:t>.</a:t>
             </a:r>
           </a:p>
           <a:p>
             <a:pPr lvl="0"/>
             <a:r>
+              <a:rPr sz="1400" dirty="0"/>
               <a:t>If the model is confident but incorrectly predicted 0.1, then </a:t>
             </a:r>
             <a:r>
-              <a:rPr>
+              <a:rPr sz="1400" dirty="0">
                 <a:latin typeface="Courier"/>
               </a:rPr>
               <a:t>Loss = -(1*log(0.1)) = 2.0258</a:t>
@@ -8402,7 +8587,7 @@
           <p:cNvPr id="5" name="Date Placeholder 4">
             <a:extLst>
               <a:ext uri="{FF2B5EF4-FFF2-40B4-BE49-F238E27FC236}">
-                <a16:creationId xmlns:a16="http://schemas.microsoft.com/office/drawing/2014/main" id="{DBA5E776-07A3-5884-2996-D8B1586FCEB5}"/>
+                <a16:creationId xmlns:a16="http://schemas.microsoft.com/office/drawing/2014/main" id="{B28A10A0-BEBF-6713-C689-7802FC02E716}"/>
               </a:ext>
             </a:extLst>
           </p:cNvPr>
@@ -8419,10 +8604,9 @@
           <a:lstStyle/>
           <a:p>
             <a:r>
-              <a:rPr lang="en-US"/>
+              <a:rPr lang="en-CA"/>
               <a:t>February 2024</a:t>
             </a:r>
-            <a:endParaRPr lang="en-CA"/>
           </a:p>
         </p:txBody>
       </p:sp>
@@ -8431,7 +8615,7 @@
           <p:cNvPr id="6" name="Footer Placeholder 5">
             <a:extLst>
               <a:ext uri="{FF2B5EF4-FFF2-40B4-BE49-F238E27FC236}">
-                <a16:creationId xmlns:a16="http://schemas.microsoft.com/office/drawing/2014/main" id="{7EBCF5A8-7D82-864D-BB95-73988A83947A}"/>
+                <a16:creationId xmlns:a16="http://schemas.microsoft.com/office/drawing/2014/main" id="{F7A6B364-E2E6-7E87-9D80-8449A0DCCF1B}"/>
               </a:ext>
             </a:extLst>
           </p:cNvPr>
@@ -8449,7 +8633,7 @@
           <a:p>
             <a:r>
               <a:rPr lang="en-US"/>
-              <a:t>Production 1 - Introduction to ML Systems</a:t>
+              <a:t>Production 1: Introduction to ML Systems</a:t>
             </a:r>
             <a:endParaRPr lang="en-CA"/>
           </a:p>
@@ -8460,7 +8644,7 @@
           <p:cNvPr id="7" name="Slide Number Placeholder 6">
             <a:extLst>
               <a:ext uri="{FF2B5EF4-FFF2-40B4-BE49-F238E27FC236}">
-                <a16:creationId xmlns:a16="http://schemas.microsoft.com/office/drawing/2014/main" id="{A5FD842A-145F-5782-1676-D37BE46BDE1C}"/>
+                <a16:creationId xmlns:a16="http://schemas.microsoft.com/office/drawing/2014/main" id="{B9ED67E5-7B04-015E-80DB-E1035343A844}"/>
               </a:ext>
             </a:extLst>
           </p:cNvPr>
@@ -8519,7 +8703,12 @@
             <p:ph type="title"/>
           </p:nvPr>
         </p:nvSpPr>
-        <p:spPr/>
+        <p:spPr>
+          <a:xfrm>
+            <a:off x="603504" y="767419"/>
+            <a:ext cx="10780776" cy="3355848"/>
+          </a:xfrm>
+        </p:spPr>
         <p:txBody>
           <a:bodyPr/>
           <a:lstStyle/>
@@ -8528,71 +8717,17 @@
               <a:buNone/>
             </a:pPr>
             <a:r>
-              <a:t>Decoupling Objectives</a:t>
-            </a:r>
-          </a:p>
-        </p:txBody>
-      </p:sp>
-      <p:sp>
-        <p:nvSpPr>
-          <p:cNvPr id="3" name="Content Placeholder 2"/>
-          <p:cNvSpPr>
-            <a:spLocks noGrp="1"/>
-          </p:cNvSpPr>
-          <p:nvPr>
-            <p:ph sz="half" idx="1"/>
-          </p:nvPr>
-        </p:nvSpPr>
-        <p:spPr/>
-        <p:txBody>
-          <a:bodyPr>
-            <a:normAutofit fontScale="85000" lnSpcReduction="20000"/>
-          </a:bodyPr>
-          <a:lstStyle/>
-          <a:p>
-            <a:pPr lvl="0"/>
-            <a:r>
-              <a:t>A product may have different (business) objectives that different models will meet.</a:t>
-            </a:r>
-          </a:p>
-          <a:p>
-            <a:pPr lvl="0"/>
-            <a:r>
-              <a:t>However, each model may compete with one another for optimal results.</a:t>
-            </a:r>
-          </a:p>
-          <a:p>
-            <a:pPr lvl="0"/>
-            <a:r>
-              <a:t>For example, we may have the following objectives:</a:t>
-            </a:r>
-          </a:p>
-          <a:p>
-            <a:pPr lvl="1"/>
-            <a:r>
-              <a:t>Filter out spam.</a:t>
-            </a:r>
-          </a:p>
-          <a:p>
-            <a:pPr lvl="1"/>
-            <a:r>
-              <a:t>Filter out NSFW content.</a:t>
-            </a:r>
-          </a:p>
-          <a:p>
-            <a:pPr lvl="1"/>
-            <a:r>
-              <a:t>Rank posts by engagement (likelihood of users clicking on it).</a:t>
-            </a:r>
-          </a:p>
-        </p:txBody>
-      </p:sp>
-      <p:sp>
-        <p:nvSpPr>
-          <p:cNvPr id="4" name="Date Placeholder 3">
+              <a:t>Our Reference Architecture</a:t>
+            </a:r>
+          </a:p>
+        </p:txBody>
+      </p:sp>
+      <p:sp>
+        <p:nvSpPr>
+          <p:cNvPr id="3" name="Date Placeholder 2">
             <a:extLst>
               <a:ext uri="{FF2B5EF4-FFF2-40B4-BE49-F238E27FC236}">
-                <a16:creationId xmlns:a16="http://schemas.microsoft.com/office/drawing/2014/main" id="{243C4892-7BAA-6EED-CBF5-AF4DCE88B400}"/>
+                <a16:creationId xmlns:a16="http://schemas.microsoft.com/office/drawing/2014/main" id="{949D0721-8950-AE34-FA47-36B1CC6A0404}"/>
               </a:ext>
             </a:extLst>
           </p:cNvPr>
@@ -8609,19 +8744,18 @@
           <a:lstStyle/>
           <a:p>
             <a:r>
-              <a:rPr lang="en-US"/>
+              <a:rPr lang="en-CA"/>
               <a:t>February 2024</a:t>
             </a:r>
-            <a:endParaRPr lang="en-CA"/>
-          </a:p>
-        </p:txBody>
-      </p:sp>
-      <p:sp>
-        <p:nvSpPr>
-          <p:cNvPr id="5" name="Footer Placeholder 4">
+          </a:p>
+        </p:txBody>
+      </p:sp>
+      <p:sp>
+        <p:nvSpPr>
+          <p:cNvPr id="4" name="Footer Placeholder 3">
             <a:extLst>
               <a:ext uri="{FF2B5EF4-FFF2-40B4-BE49-F238E27FC236}">
-                <a16:creationId xmlns:a16="http://schemas.microsoft.com/office/drawing/2014/main" id="{26FAEB6A-BE3B-F18D-51EC-AC4B179B8B4E}"/>
+                <a16:creationId xmlns:a16="http://schemas.microsoft.com/office/drawing/2014/main" id="{D5B98103-15FB-34F6-6680-C710EC39337F}"/>
               </a:ext>
             </a:extLst>
           </p:cNvPr>
@@ -8639,7 +8773,7 @@
           <a:p>
             <a:r>
               <a:rPr lang="en-US"/>
-              <a:t>Production 1 - Introduction to ML Systems</a:t>
+              <a:t>Production 1: Introduction to ML Systems</a:t>
             </a:r>
             <a:endParaRPr lang="en-CA"/>
           </a:p>
@@ -8647,10 +8781,10 @@
       </p:sp>
       <p:sp>
         <p:nvSpPr>
-          <p:cNvPr id="6" name="Slide Number Placeholder 5">
+          <p:cNvPr id="5" name="Slide Number Placeholder 4">
             <a:extLst>
               <a:ext uri="{FF2B5EF4-FFF2-40B4-BE49-F238E27FC236}">
-                <a16:creationId xmlns:a16="http://schemas.microsoft.com/office/drawing/2014/main" id="{3FD2EE84-1859-90D6-7D98-607C1E61A4EA}"/>
+                <a16:creationId xmlns:a16="http://schemas.microsoft.com/office/drawing/2014/main" id="{FD5A19E9-6808-2345-C0DA-4C8C709A6FD0}"/>
               </a:ext>
             </a:extLst>
           </p:cNvPr>
@@ -8669,6 +8803,341 @@
             <a:fld id="{4F4BDF5D-830C-4829-B676-EE421164B1C8}" type="slidenum">
               <a:rPr lang="en-CA" smtClean="0"/>
               <a:t>27</a:t>
+            </a:fld>
+            <a:endParaRPr lang="en-CA"/>
+          </a:p>
+        </p:txBody>
+      </p:sp>
+    </p:spTree>
+  </p:cSld>
+  <p:clrMapOvr>
+    <a:masterClrMapping/>
+  </p:clrMapOvr>
+</p:sld>
+</file>
+
+<file path=ppt/slides/slide28.xml><?xml version="1.0" encoding="utf-8"?>
+<p:sld xmlns:a="http://schemas.openxmlformats.org/drawingml/2006/main" xmlns:r="http://schemas.openxmlformats.org/officeDocument/2006/relationships" xmlns:p="http://schemas.openxmlformats.org/presentationml/2006/main">
+  <p:cSld>
+    <p:spTree>
+      <p:nvGrpSpPr>
+        <p:cNvPr id="1" name=""/>
+        <p:cNvGrpSpPr/>
+        <p:nvPr/>
+      </p:nvGrpSpPr>
+      <p:grpSpPr>
+        <a:xfrm>
+          <a:off x="0" y="0"/>
+          <a:ext cx="0" cy="0"/>
+          <a:chOff x="0" y="0"/>
+          <a:chExt cx="0" cy="0"/>
+        </a:xfrm>
+      </p:grpSpPr>
+      <p:pic>
+        <p:nvPicPr>
+          <p:cNvPr id="3" name="Picture 1" descr="../img/flock_ref_arhitecture.png"/>
+          <p:cNvPicPr>
+            <a:picLocks noGrp="1" noChangeAspect="1"/>
+          </p:cNvPicPr>
+          <p:nvPr/>
+        </p:nvPicPr>
+        <p:blipFill>
+          <a:blip r:embed="rId2"/>
+          <a:stretch>
+            <a:fillRect/>
+          </a:stretch>
+        </p:blipFill>
+        <p:spPr bwMode="auto">
+          <a:xfrm>
+            <a:off x="1172832" y="1278754"/>
+            <a:ext cx="9744736" cy="4706892"/>
+          </a:xfrm>
+          <a:prstGeom prst="rect">
+            <a:avLst/>
+          </a:prstGeom>
+          <a:noFill/>
+          <a:ln w="9525">
+            <a:noFill/>
+            <a:headEnd/>
+            <a:tailEnd/>
+          </a:ln>
+        </p:spPr>
+      </p:pic>
+      <p:sp>
+        <p:nvSpPr>
+          <p:cNvPr id="2" name="Title 1"/>
+          <p:cNvSpPr>
+            <a:spLocks noGrp="1"/>
+          </p:cNvSpPr>
+          <p:nvPr>
+            <p:ph type="title"/>
+          </p:nvPr>
+        </p:nvSpPr>
+        <p:spPr/>
+        <p:txBody>
+          <a:bodyPr/>
+          <a:lstStyle/>
+          <a:p>
+            <a:pPr marL="0" lvl="0" indent="0">
+              <a:buNone/>
+            </a:pPr>
+            <a:r>
+              <a:t>The Flock Reference Architecture</a:t>
+            </a:r>
+          </a:p>
+        </p:txBody>
+      </p:sp>
+      <p:sp>
+        <p:nvSpPr>
+          <p:cNvPr id="4" name="TextBox 3"/>
+          <p:cNvSpPr txBox="1"/>
+          <p:nvPr/>
+        </p:nvSpPr>
+        <p:spPr>
+          <a:xfrm>
+            <a:off x="673100" y="5926724"/>
+            <a:ext cx="10744200" cy="508000"/>
+          </a:xfrm>
+          <a:prstGeom prst="rect">
+            <a:avLst/>
+          </a:prstGeom>
+          <a:noFill/>
+        </p:spPr>
+        <p:txBody>
+          <a:bodyPr/>
+          <a:lstStyle/>
+          <a:p>
+            <a:pPr marL="0" lvl="0" indent="0" algn="ctr">
+              <a:buNone/>
+            </a:pPr>
+            <a:r>
+              <a:rPr sz="1100" dirty="0"/>
+              <a:t>Agrawal et al (2019)</a:t>
+            </a:r>
+          </a:p>
+        </p:txBody>
+      </p:sp>
+      <p:sp>
+        <p:nvSpPr>
+          <p:cNvPr id="5" name="Date Placeholder 4">
+            <a:extLst>
+              <a:ext uri="{FF2B5EF4-FFF2-40B4-BE49-F238E27FC236}">
+                <a16:creationId xmlns:a16="http://schemas.microsoft.com/office/drawing/2014/main" id="{987BA8F0-070B-8EC9-FD37-DA0ADA70DDBB}"/>
+              </a:ext>
+            </a:extLst>
+          </p:cNvPr>
+          <p:cNvSpPr>
+            <a:spLocks noGrp="1"/>
+          </p:cNvSpPr>
+          <p:nvPr>
+            <p:ph type="dt" sz="half" idx="10"/>
+          </p:nvPr>
+        </p:nvSpPr>
+        <p:spPr/>
+        <p:txBody>
+          <a:bodyPr/>
+          <a:lstStyle/>
+          <a:p>
+            <a:r>
+              <a:rPr lang="en-CA"/>
+              <a:t>February 2024</a:t>
+            </a:r>
+          </a:p>
+        </p:txBody>
+      </p:sp>
+      <p:sp>
+        <p:nvSpPr>
+          <p:cNvPr id="6" name="Footer Placeholder 5">
+            <a:extLst>
+              <a:ext uri="{FF2B5EF4-FFF2-40B4-BE49-F238E27FC236}">
+                <a16:creationId xmlns:a16="http://schemas.microsoft.com/office/drawing/2014/main" id="{3B66F506-8169-B0B8-F197-BA6A150D4A2B}"/>
+              </a:ext>
+            </a:extLst>
+          </p:cNvPr>
+          <p:cNvSpPr>
+            <a:spLocks noGrp="1"/>
+          </p:cNvSpPr>
+          <p:nvPr>
+            <p:ph type="ftr" sz="quarter" idx="11"/>
+          </p:nvPr>
+        </p:nvSpPr>
+        <p:spPr/>
+        <p:txBody>
+          <a:bodyPr/>
+          <a:lstStyle/>
+          <a:p>
+            <a:r>
+              <a:rPr lang="en-US"/>
+              <a:t>Production 1: Introduction to ML Systems</a:t>
+            </a:r>
+            <a:endParaRPr lang="en-CA"/>
+          </a:p>
+        </p:txBody>
+      </p:sp>
+      <p:sp>
+        <p:nvSpPr>
+          <p:cNvPr id="7" name="Slide Number Placeholder 6">
+            <a:extLst>
+              <a:ext uri="{FF2B5EF4-FFF2-40B4-BE49-F238E27FC236}">
+                <a16:creationId xmlns:a16="http://schemas.microsoft.com/office/drawing/2014/main" id="{E85F9B09-7DA5-DBF9-67D9-9C3D340B348F}"/>
+              </a:ext>
+            </a:extLst>
+          </p:cNvPr>
+          <p:cNvSpPr>
+            <a:spLocks noGrp="1"/>
+          </p:cNvSpPr>
+          <p:nvPr>
+            <p:ph type="sldNum" sz="quarter" idx="12"/>
+          </p:nvPr>
+        </p:nvSpPr>
+        <p:spPr/>
+        <p:txBody>
+          <a:bodyPr/>
+          <a:lstStyle/>
+          <a:p>
+            <a:fld id="{4F4BDF5D-830C-4829-B676-EE421164B1C8}" type="slidenum">
+              <a:rPr lang="en-CA" smtClean="0"/>
+              <a:t>28</a:t>
+            </a:fld>
+            <a:endParaRPr lang="en-CA"/>
+          </a:p>
+        </p:txBody>
+      </p:sp>
+    </p:spTree>
+  </p:cSld>
+  <p:clrMapOvr>
+    <a:masterClrMapping/>
+  </p:clrMapOvr>
+</p:sld>
+</file>
+
+<file path=ppt/slides/slide29.xml><?xml version="1.0" encoding="utf-8"?>
+<p:sld xmlns:a="http://schemas.openxmlformats.org/drawingml/2006/main" xmlns:r="http://schemas.openxmlformats.org/officeDocument/2006/relationships" xmlns:p="http://schemas.openxmlformats.org/presentationml/2006/main">
+  <p:cSld>
+    <p:spTree>
+      <p:nvGrpSpPr>
+        <p:cNvPr id="1" name=""/>
+        <p:cNvGrpSpPr/>
+        <p:nvPr/>
+      </p:nvGrpSpPr>
+      <p:grpSpPr>
+        <a:xfrm>
+          <a:off x="0" y="0"/>
+          <a:ext cx="0" cy="0"/>
+          <a:chOff x="0" y="0"/>
+          <a:chExt cx="0" cy="0"/>
+        </a:xfrm>
+      </p:grpSpPr>
+      <p:sp>
+        <p:nvSpPr>
+          <p:cNvPr id="2" name="Title 1"/>
+          <p:cNvSpPr>
+            <a:spLocks noGrp="1"/>
+          </p:cNvSpPr>
+          <p:nvPr>
+            <p:ph type="title"/>
+          </p:nvPr>
+        </p:nvSpPr>
+        <p:spPr>
+          <a:xfrm>
+            <a:off x="603504" y="767419"/>
+            <a:ext cx="10780776" cy="3355848"/>
+          </a:xfrm>
+        </p:spPr>
+        <p:txBody>
+          <a:bodyPr/>
+          <a:lstStyle/>
+          <a:p>
+            <a:pPr marL="0" lvl="0" indent="0">
+              <a:buNone/>
+            </a:pPr>
+            <a:r>
+              <a:t>References</a:t>
+            </a:r>
+          </a:p>
+        </p:txBody>
+      </p:sp>
+      <p:sp>
+        <p:nvSpPr>
+          <p:cNvPr id="3" name="Date Placeholder 2">
+            <a:extLst>
+              <a:ext uri="{FF2B5EF4-FFF2-40B4-BE49-F238E27FC236}">
+                <a16:creationId xmlns:a16="http://schemas.microsoft.com/office/drawing/2014/main" id="{8B7933AC-5989-A9BB-4312-067909B3967D}"/>
+              </a:ext>
+            </a:extLst>
+          </p:cNvPr>
+          <p:cNvSpPr>
+            <a:spLocks noGrp="1"/>
+          </p:cNvSpPr>
+          <p:nvPr>
+            <p:ph type="dt" sz="half" idx="10"/>
+          </p:nvPr>
+        </p:nvSpPr>
+        <p:spPr/>
+        <p:txBody>
+          <a:bodyPr/>
+          <a:lstStyle/>
+          <a:p>
+            <a:r>
+              <a:rPr lang="en-CA"/>
+              <a:t>February 2024</a:t>
+            </a:r>
+          </a:p>
+        </p:txBody>
+      </p:sp>
+      <p:sp>
+        <p:nvSpPr>
+          <p:cNvPr id="4" name="Footer Placeholder 3">
+            <a:extLst>
+              <a:ext uri="{FF2B5EF4-FFF2-40B4-BE49-F238E27FC236}">
+                <a16:creationId xmlns:a16="http://schemas.microsoft.com/office/drawing/2014/main" id="{3B40963F-86A7-D566-965B-36C382E15668}"/>
+              </a:ext>
+            </a:extLst>
+          </p:cNvPr>
+          <p:cNvSpPr>
+            <a:spLocks noGrp="1"/>
+          </p:cNvSpPr>
+          <p:nvPr>
+            <p:ph type="ftr" sz="quarter" idx="11"/>
+          </p:nvPr>
+        </p:nvSpPr>
+        <p:spPr/>
+        <p:txBody>
+          <a:bodyPr/>
+          <a:lstStyle/>
+          <a:p>
+            <a:r>
+              <a:rPr lang="en-US"/>
+              <a:t>Production 1: Introduction to ML Systems</a:t>
+            </a:r>
+            <a:endParaRPr lang="en-CA"/>
+          </a:p>
+        </p:txBody>
+      </p:sp>
+      <p:sp>
+        <p:nvSpPr>
+          <p:cNvPr id="5" name="Slide Number Placeholder 4">
+            <a:extLst>
+              <a:ext uri="{FF2B5EF4-FFF2-40B4-BE49-F238E27FC236}">
+                <a16:creationId xmlns:a16="http://schemas.microsoft.com/office/drawing/2014/main" id="{B8B1F61F-328D-1405-9D1A-A14FBA4AC309}"/>
+              </a:ext>
+            </a:extLst>
+          </p:cNvPr>
+          <p:cNvSpPr>
+            <a:spLocks noGrp="1"/>
+          </p:cNvSpPr>
+          <p:nvPr>
+            <p:ph type="sldNum" sz="quarter" idx="12"/>
+          </p:nvPr>
+        </p:nvSpPr>
+        <p:spPr/>
+        <p:txBody>
+          <a:bodyPr/>
+          <a:lstStyle/>
+          <a:p>
+            <a:fld id="{4F4BDF5D-830C-4829-B676-EE421164B1C8}" type="slidenum">
+              <a:rPr lang="en-CA" smtClean="0"/>
+              <a:t>29</a:t>
             </a:fld>
             <a:endParaRPr lang="en-CA"/>
           </a:p>
@@ -8838,6 +9307,18 @@
           <a:p>
             <a:pPr lvl="0"/>
             <a:r>
+              <a:t>Introduction.</a:t>
+            </a:r>
+          </a:p>
+          <a:p>
+            <a:pPr lvl="0"/>
+            <a:r>
+              <a:t>Repo File Structure.</a:t>
+            </a:r>
+          </a:p>
+          <a:p>
+            <a:pPr lvl="0"/>
+            <a:r>
               <a:t>Git, authorization, and production pipelines.</a:t>
             </a:r>
           </a:p>
@@ -8851,12 +9332,6 @@
             <a:pPr lvl="0"/>
             <a:r>
               <a:t>Python virtual environments.</a:t>
-            </a:r>
-          </a:p>
-          <a:p>
-            <a:pPr lvl="0"/>
-            <a:r>
-              <a:t>Repo File Structure.</a:t>
             </a:r>
           </a:p>
           <a:p>
@@ -8878,7 +9353,7 @@
           <p:cNvPr id="5" name="Date Placeholder 4">
             <a:extLst>
               <a:ext uri="{FF2B5EF4-FFF2-40B4-BE49-F238E27FC236}">
-                <a16:creationId xmlns:a16="http://schemas.microsoft.com/office/drawing/2014/main" id="{EA69E410-0FBA-ADA0-CA61-BD618EB354B4}"/>
+                <a16:creationId xmlns:a16="http://schemas.microsoft.com/office/drawing/2014/main" id="{D16F5B3D-EDCB-B648-B6C6-CA3AD323095E}"/>
               </a:ext>
             </a:extLst>
           </p:cNvPr>
@@ -8895,10 +9370,9 @@
           <a:lstStyle/>
           <a:p>
             <a:r>
-              <a:rPr lang="en-US"/>
+              <a:rPr lang="en-CA"/>
               <a:t>February 2024</a:t>
             </a:r>
-            <a:endParaRPr lang="en-CA"/>
           </a:p>
         </p:txBody>
       </p:sp>
@@ -8907,7 +9381,7 @@
           <p:cNvPr id="6" name="Footer Placeholder 5">
             <a:extLst>
               <a:ext uri="{FF2B5EF4-FFF2-40B4-BE49-F238E27FC236}">
-                <a16:creationId xmlns:a16="http://schemas.microsoft.com/office/drawing/2014/main" id="{E25150B9-BBE5-407C-F87C-7527E979B933}"/>
+                <a16:creationId xmlns:a16="http://schemas.microsoft.com/office/drawing/2014/main" id="{E7A346B6-B866-1C7A-6F3C-90E965EAEEEA}"/>
               </a:ext>
             </a:extLst>
           </p:cNvPr>
@@ -8925,7 +9399,7 @@
           <a:p>
             <a:r>
               <a:rPr lang="en-US"/>
-              <a:t>Production 1 - Introduction to ML Systems</a:t>
+              <a:t>Production 1: Introduction to ML Systems</a:t>
             </a:r>
             <a:endParaRPr lang="en-CA"/>
           </a:p>
@@ -8936,7 +9410,7 @@
           <p:cNvPr id="7" name="Slide Number Placeholder 6">
             <a:extLst>
               <a:ext uri="{FF2B5EF4-FFF2-40B4-BE49-F238E27FC236}">
-                <a16:creationId xmlns:a16="http://schemas.microsoft.com/office/drawing/2014/main" id="{B12F11D7-4991-5D96-251F-5C52586D9267}"/>
+                <a16:creationId xmlns:a16="http://schemas.microsoft.com/office/drawing/2014/main" id="{D41BAA77-F208-16E6-B197-58F90ABB9130}"/>
               </a:ext>
             </a:extLst>
           </p:cNvPr>
@@ -8955,6 +9429,240 @@
             <a:fld id="{4F4BDF5D-830C-4829-B676-EE421164B1C8}" type="slidenum">
               <a:rPr lang="en-CA" smtClean="0"/>
               <a:t>3</a:t>
+            </a:fld>
+            <a:endParaRPr lang="en-CA"/>
+          </a:p>
+        </p:txBody>
+      </p:sp>
+    </p:spTree>
+  </p:cSld>
+  <p:clrMapOvr>
+    <a:masterClrMapping/>
+  </p:clrMapOvr>
+</p:sld>
+</file>
+
+<file path=ppt/slides/slide30.xml><?xml version="1.0" encoding="utf-8"?>
+<p:sld xmlns:a="http://schemas.openxmlformats.org/drawingml/2006/main" xmlns:r="http://schemas.openxmlformats.org/officeDocument/2006/relationships" xmlns:p="http://schemas.openxmlformats.org/presentationml/2006/main">
+  <p:cSld>
+    <p:spTree>
+      <p:nvGrpSpPr>
+        <p:cNvPr id="1" name=""/>
+        <p:cNvGrpSpPr/>
+        <p:nvPr/>
+      </p:nvGrpSpPr>
+      <p:grpSpPr>
+        <a:xfrm>
+          <a:off x="0" y="0"/>
+          <a:ext cx="0" cy="0"/>
+          <a:chOff x="0" y="0"/>
+          <a:chExt cx="0" cy="0"/>
+        </a:xfrm>
+      </p:grpSpPr>
+      <p:sp>
+        <p:nvSpPr>
+          <p:cNvPr id="2" name="Title 1"/>
+          <p:cNvSpPr>
+            <a:spLocks noGrp="1"/>
+          </p:cNvSpPr>
+          <p:nvPr>
+            <p:ph type="title"/>
+          </p:nvPr>
+        </p:nvSpPr>
+        <p:spPr/>
+        <p:txBody>
+          <a:bodyPr/>
+          <a:lstStyle/>
+          <a:p>
+            <a:pPr marL="0" lvl="0" indent="0">
+              <a:buNone/>
+            </a:pPr>
+            <a:r>
+              <a:t>References</a:t>
+            </a:r>
+          </a:p>
+        </p:txBody>
+      </p:sp>
+      <p:sp>
+        <p:nvSpPr>
+          <p:cNvPr id="3" name="Content Placeholder 2"/>
+          <p:cNvSpPr>
+            <a:spLocks noGrp="1"/>
+          </p:cNvSpPr>
+          <p:nvPr>
+            <p:ph idx="1"/>
+          </p:nvPr>
+        </p:nvSpPr>
+        <p:spPr/>
+        <p:txBody>
+          <a:bodyPr/>
+          <a:lstStyle/>
+          <a:p>
+            <a:pPr lvl="0"/>
+            <a:r>
+              <a:rPr dirty="0"/>
+              <a:t>Agrawal, A. et al. “Cloudy with high chance of DBMS: A 10-year prediction for Enterprise-Grade ML.” </a:t>
+            </a:r>
+            <a:r>
+              <a:rPr dirty="0" err="1"/>
+              <a:t>arXiv</a:t>
+            </a:r>
+            <a:r>
+              <a:rPr dirty="0"/>
+              <a:t> preprint arXiv:1909.00084 (2019).</a:t>
+            </a:r>
+          </a:p>
+          <a:p>
+            <a:pPr lvl="0"/>
+            <a:r>
+              <a:rPr dirty="0" err="1"/>
+              <a:t>Huyen</a:t>
+            </a:r>
+            <a:r>
+              <a:rPr dirty="0"/>
+              <a:t>, Chip. “Designing machine learning systems.” O’Reilly Media, Inc.(2022).</a:t>
+            </a:r>
+          </a:p>
+          <a:p>
+            <a:pPr lvl="0"/>
+            <a:r>
+              <a:rPr dirty="0" err="1"/>
+              <a:t>Kleppmann</a:t>
+            </a:r>
+            <a:r>
+              <a:rPr dirty="0"/>
+              <a:t>, M. “Designing data-intensive applications: The big ideas behind reliable, scalable, and maintainable systems.” O’Reilly Media, Inc. (2017).</a:t>
+            </a:r>
+          </a:p>
+          <a:p>
+            <a:pPr lvl="0"/>
+            <a:r>
+              <a:rPr dirty="0"/>
+              <a:t>Mitchell, Tom M. “Machine learning.” (1997).</a:t>
+            </a:r>
+          </a:p>
+          <a:p>
+            <a:pPr lvl="0"/>
+            <a:r>
+              <a:rPr dirty="0" err="1"/>
+              <a:t>Olah</a:t>
+            </a:r>
+            <a:r>
+              <a:rPr dirty="0"/>
+              <a:t>, C. “Conv Nets: A Modular Perspective.” (2014) </a:t>
+            </a:r>
+            <a:r>
+              <a:rPr dirty="0">
+                <a:hlinkClick r:id="rId2"/>
+              </a:rPr>
+              <a:t>URL</a:t>
+            </a:r>
+          </a:p>
+          <a:p>
+            <a:pPr lvl="0"/>
+            <a:r>
+              <a:rPr dirty="0"/>
+              <a:t>Sculley, D. et al. “Hidden technical debt in machine learning systems.” Advances in neural information processing systems 28 (2015).</a:t>
+            </a:r>
+          </a:p>
+          <a:p>
+            <a:pPr lvl="0"/>
+            <a:r>
+              <a:rPr dirty="0"/>
+              <a:t>Wirth, R. and J. </a:t>
+            </a:r>
+            <a:r>
+              <a:rPr dirty="0" err="1"/>
+              <a:t>Hipp</a:t>
+            </a:r>
+            <a:r>
+              <a:rPr dirty="0"/>
+              <a:t>. “CRISP-DM: Towards a standard process model for data mining.” Proceedings of the 4th international conference on the practical applications of knowledge discovery and data mining. Vol. 1. (2000).</a:t>
+            </a:r>
+          </a:p>
+        </p:txBody>
+      </p:sp>
+      <p:sp>
+        <p:nvSpPr>
+          <p:cNvPr id="4" name="Date Placeholder 3">
+            <a:extLst>
+              <a:ext uri="{FF2B5EF4-FFF2-40B4-BE49-F238E27FC236}">
+                <a16:creationId xmlns:a16="http://schemas.microsoft.com/office/drawing/2014/main" id="{F16E9333-7489-1EC2-6A13-09F44F497AD5}"/>
+              </a:ext>
+            </a:extLst>
+          </p:cNvPr>
+          <p:cNvSpPr>
+            <a:spLocks noGrp="1"/>
+          </p:cNvSpPr>
+          <p:nvPr>
+            <p:ph type="dt" sz="half" idx="10"/>
+          </p:nvPr>
+        </p:nvSpPr>
+        <p:spPr/>
+        <p:txBody>
+          <a:bodyPr/>
+          <a:lstStyle/>
+          <a:p>
+            <a:r>
+              <a:rPr lang="en-CA"/>
+              <a:t>February 2024</a:t>
+            </a:r>
+          </a:p>
+        </p:txBody>
+      </p:sp>
+      <p:sp>
+        <p:nvSpPr>
+          <p:cNvPr id="5" name="Footer Placeholder 4">
+            <a:extLst>
+              <a:ext uri="{FF2B5EF4-FFF2-40B4-BE49-F238E27FC236}">
+                <a16:creationId xmlns:a16="http://schemas.microsoft.com/office/drawing/2014/main" id="{A521B7D4-E407-0786-1627-3E8612C55806}"/>
+              </a:ext>
+            </a:extLst>
+          </p:cNvPr>
+          <p:cNvSpPr>
+            <a:spLocks noGrp="1"/>
+          </p:cNvSpPr>
+          <p:nvPr>
+            <p:ph type="ftr" sz="quarter" idx="11"/>
+          </p:nvPr>
+        </p:nvSpPr>
+        <p:spPr/>
+        <p:txBody>
+          <a:bodyPr/>
+          <a:lstStyle/>
+          <a:p>
+            <a:r>
+              <a:rPr lang="en-US"/>
+              <a:t>Production 1: Introduction to ML Systems</a:t>
+            </a:r>
+            <a:endParaRPr lang="en-CA"/>
+          </a:p>
+        </p:txBody>
+      </p:sp>
+      <p:sp>
+        <p:nvSpPr>
+          <p:cNvPr id="6" name="Slide Number Placeholder 5">
+            <a:extLst>
+              <a:ext uri="{FF2B5EF4-FFF2-40B4-BE49-F238E27FC236}">
+                <a16:creationId xmlns:a16="http://schemas.microsoft.com/office/drawing/2014/main" id="{518FAC26-449F-F481-3A12-D0031226B178}"/>
+              </a:ext>
+            </a:extLst>
+          </p:cNvPr>
+          <p:cNvSpPr>
+            <a:spLocks noGrp="1"/>
+          </p:cNvSpPr>
+          <p:nvPr>
+            <p:ph type="sldNum" sz="quarter" idx="12"/>
+          </p:nvPr>
+        </p:nvSpPr>
+        <p:spPr/>
+        <p:txBody>
+          <a:bodyPr/>
+          <a:lstStyle/>
+          <a:p>
+            <a:fld id="{4F4BDF5D-830C-4829-B676-EE421164B1C8}" type="slidenum">
+              <a:rPr lang="en-CA" smtClean="0"/>
+              <a:t>30</a:t>
             </a:fld>
             <a:endParaRPr lang="en-CA"/>
           </a:p>
@@ -9004,7 +9712,7 @@
               <a:buNone/>
             </a:pPr>
             <a:r>
-              <a:t>About These Notes</a:t>
+              <a:t>Slides, Notebooks, and Code</a:t>
             </a:r>
           </a:p>
         </p:txBody>
@@ -9021,72 +9729,186 @@
         </p:nvSpPr>
         <p:spPr/>
         <p:txBody>
-          <a:bodyPr/>
+          <a:bodyPr>
+            <a:normAutofit/>
+          </a:bodyPr>
           <a:lstStyle/>
           <a:p>
             <a:pPr marL="0" lvl="0" indent="0">
               <a:buNone/>
             </a:pPr>
             <a:r>
+              <a:rPr sz="1400" b="1" dirty="0"/>
+              <a:t>Slides</a:t>
+            </a:r>
+          </a:p>
+          <a:p>
+            <a:pPr lvl="0"/>
+            <a:r>
+              <a:rPr sz="1400" dirty="0"/>
               <a:t>These notes are based on Chapters 1 and 2 of </a:t>
             </a:r>
             <a:r>
-              <a:rPr i="1">
+              <a:rPr sz="1400" i="1" dirty="0">
                 <a:hlinkClick r:id="rId2"/>
               </a:rPr>
               <a:t>Designing Machine Learning Systems</a:t>
             </a:r>
             <a:r>
+              <a:rPr sz="1400" dirty="0"/>
               <a:t>, by </a:t>
             </a:r>
             <a:r>
-              <a:rPr>
+              <a:rPr sz="1400" dirty="0">
                 <a:hlinkClick r:id="rId3"/>
               </a:rPr>
-              <a:t>Chip Huyen</a:t>
-            </a:r>
-            <a:r>
+              <a:t>Chip </a:t>
+            </a:r>
+            <a:r>
+              <a:rPr sz="1400" dirty="0" err="1">
+                <a:hlinkClick r:id="rId3"/>
+              </a:rPr>
+              <a:t>Huyen</a:t>
+            </a:r>
+            <a:r>
+              <a:rPr sz="1400" dirty="0"/>
               <a:t>.</a:t>
             </a:r>
           </a:p>
         </p:txBody>
       </p:sp>
-      <p:pic>
-        <p:nvPicPr>
-          <p:cNvPr id="4" name="Picture 1" descr="../img/book_cover.png"/>
-          <p:cNvPicPr>
-            <a:picLocks noGrp="1" noChangeAspect="1"/>
-          </p:cNvPicPr>
-          <p:nvPr/>
-        </p:nvPicPr>
-        <p:blipFill>
-          <a:blip r:embed="rId4"/>
-          <a:stretch>
-            <a:fillRect/>
-          </a:stretch>
-        </p:blipFill>
-        <p:spPr bwMode="auto">
-          <a:xfrm>
-            <a:off x="6096000" y="600075"/>
-            <a:ext cx="4572000" cy="5924549"/>
-          </a:xfrm>
-          <a:prstGeom prst="rect">
-            <a:avLst/>
-          </a:prstGeom>
-          <a:noFill/>
-          <a:ln w="9525">
-            <a:noFill/>
-            <a:headEnd/>
-            <a:tailEnd/>
-          </a:ln>
-        </p:spPr>
-      </p:pic>
+      <p:sp>
+        <p:nvSpPr>
+          <p:cNvPr id="4" name="Content Placeholder 3"/>
+          <p:cNvSpPr>
+            <a:spLocks noGrp="1"/>
+          </p:cNvSpPr>
+          <p:nvPr>
+            <p:ph sz="half" idx="2"/>
+          </p:nvPr>
+        </p:nvSpPr>
+        <p:spPr/>
+        <p:txBody>
+          <a:bodyPr>
+            <a:normAutofit/>
+          </a:bodyPr>
+          <a:lstStyle/>
+          <a:p>
+            <a:pPr marL="0" lvl="0" indent="0">
+              <a:buNone/>
+            </a:pPr>
+            <a:r>
+              <a:rPr sz="1400" b="1" dirty="0"/>
+              <a:t>Notebooks</a:t>
+            </a:r>
+          </a:p>
+          <a:p>
+            <a:pPr lvl="0"/>
+            <a:r>
+              <a:rPr sz="1400" dirty="0">
+                <a:latin typeface="Courier"/>
+              </a:rPr>
+              <a:t>./notebooks/production_1_setup.ipynb</a:t>
+            </a:r>
+          </a:p>
+          <a:p>
+            <a:pPr marL="0" lvl="0" indent="0">
+              <a:buNone/>
+            </a:pPr>
+            <a:r>
+              <a:rPr sz="1400" b="1" dirty="0"/>
+              <a:t>Code</a:t>
+            </a:r>
+          </a:p>
+          <a:p>
+            <a:pPr lvl="0"/>
+            <a:r>
+              <a:rPr sz="1400" dirty="0">
+                <a:latin typeface="Courier"/>
+              </a:rPr>
+              <a:t>./src/logger.py</a:t>
+            </a:r>
+          </a:p>
+          <a:p>
+            <a:pPr lvl="0"/>
+            <a:r>
+              <a:rPr sz="1400" dirty="0">
+                <a:latin typeface="Courier"/>
+              </a:rPr>
+              <a:t>./</a:t>
+            </a:r>
+            <a:r>
+              <a:rPr sz="1400" dirty="0" err="1">
+                <a:latin typeface="Courier"/>
+              </a:rPr>
+              <a:t>src</a:t>
+            </a:r>
+            <a:r>
+              <a:rPr sz="1400" dirty="0">
+                <a:latin typeface="Courier"/>
+              </a:rPr>
+              <a:t>/.env</a:t>
+            </a:r>
+          </a:p>
+          <a:p>
+            <a:pPr lvl="0"/>
+            <a:r>
+              <a:rPr sz="1400" dirty="0">
+                <a:latin typeface="Courier"/>
+              </a:rPr>
+              <a:t>./</a:t>
+            </a:r>
+            <a:r>
+              <a:rPr sz="1400" dirty="0" err="1">
+                <a:latin typeface="Courier"/>
+              </a:rPr>
+              <a:t>src</a:t>
+            </a:r>
+            <a:r>
+              <a:rPr sz="1400" dirty="0">
+                <a:latin typeface="Courier"/>
+              </a:rPr>
+              <a:t>/docker/docker-</a:t>
+            </a:r>
+            <a:r>
+              <a:rPr sz="1400" dirty="0" err="1">
+                <a:latin typeface="Courier"/>
+              </a:rPr>
+              <a:t>compose.yml</a:t>
+            </a:r>
+            <a:endParaRPr sz="1400" dirty="0">
+              <a:latin typeface="Courier"/>
+            </a:endParaRPr>
+          </a:p>
+          <a:p>
+            <a:pPr lvl="0"/>
+            <a:r>
+              <a:rPr sz="1400" dirty="0">
+                <a:latin typeface="Courier"/>
+              </a:rPr>
+              <a:t>./</a:t>
+            </a:r>
+            <a:r>
+              <a:rPr sz="1400" dirty="0" err="1">
+                <a:latin typeface="Courier"/>
+              </a:rPr>
+              <a:t>src</a:t>
+            </a:r>
+            <a:r>
+              <a:rPr sz="1400" dirty="0">
+                <a:latin typeface="Courier"/>
+              </a:rPr>
+              <a:t>/docker/.env</a:t>
+            </a:r>
+          </a:p>
+        </p:txBody>
+      </p:sp>
       <p:sp>
         <p:nvSpPr>
           <p:cNvPr id="5" name="Date Placeholder 4">
             <a:extLst>
               <a:ext uri="{FF2B5EF4-FFF2-40B4-BE49-F238E27FC236}">
-                <a16:creationId xmlns:a16="http://schemas.microsoft.com/office/drawing/2014/main" id="{7A6E0B6D-50AF-D94F-6651-CE24CCF80EBA}"/>
+                <a16:creationId xmlns:a16="http://schemas.microsoft.com/office/drawing/2014/main" id="{E1E96781-98A0-2F5F-51FD-8CB538B504C9}"/>
               </a:ext>
             </a:extLst>
           </p:cNvPr>
@@ -9103,10 +9925,9 @@
           <a:lstStyle/>
           <a:p>
             <a:r>
-              <a:rPr lang="en-US"/>
+              <a:rPr lang="en-CA"/>
               <a:t>February 2024</a:t>
             </a:r>
-            <a:endParaRPr lang="en-CA"/>
           </a:p>
         </p:txBody>
       </p:sp>
@@ -9115,7 +9936,7 @@
           <p:cNvPr id="6" name="Footer Placeholder 5">
             <a:extLst>
               <a:ext uri="{FF2B5EF4-FFF2-40B4-BE49-F238E27FC236}">
-                <a16:creationId xmlns:a16="http://schemas.microsoft.com/office/drawing/2014/main" id="{12CAFF04-BA24-238A-7775-7BE0D9BCBB8F}"/>
+                <a16:creationId xmlns:a16="http://schemas.microsoft.com/office/drawing/2014/main" id="{9A127A3C-BCEE-A9FE-B1BC-EB41AEF6FB44}"/>
               </a:ext>
             </a:extLst>
           </p:cNvPr>
@@ -9133,7 +9954,7 @@
           <a:p>
             <a:r>
               <a:rPr lang="en-US"/>
-              <a:t>Production 1 - Introduction to ML Systems</a:t>
+              <a:t>Production 1: Introduction to ML Systems</a:t>
             </a:r>
             <a:endParaRPr lang="en-CA"/>
           </a:p>
@@ -9144,7 +9965,7 @@
           <p:cNvPr id="7" name="Slide Number Placeholder 6">
             <a:extLst>
               <a:ext uri="{FF2B5EF4-FFF2-40B4-BE49-F238E27FC236}">
-                <a16:creationId xmlns:a16="http://schemas.microsoft.com/office/drawing/2014/main" id="{7AD840F2-71F3-26D7-8B80-461F7C07B9DC}"/>
+                <a16:creationId xmlns:a16="http://schemas.microsoft.com/office/drawing/2014/main" id="{CFD55584-5EDF-F6DB-D560-088EF8C741F8}"/>
               </a:ext>
             </a:extLst>
           </p:cNvPr>
@@ -9227,7 +10048,7 @@
           <p:cNvPr id="3" name="Date Placeholder 2">
             <a:extLst>
               <a:ext uri="{FF2B5EF4-FFF2-40B4-BE49-F238E27FC236}">
-                <a16:creationId xmlns:a16="http://schemas.microsoft.com/office/drawing/2014/main" id="{7193F8BA-7F04-DBDA-BB7A-866AA15EACB4}"/>
+                <a16:creationId xmlns:a16="http://schemas.microsoft.com/office/drawing/2014/main" id="{C287166B-481F-C26A-FA8A-23018F7CB0AC}"/>
               </a:ext>
             </a:extLst>
           </p:cNvPr>
@@ -9244,10 +10065,9 @@
           <a:lstStyle/>
           <a:p>
             <a:r>
-              <a:rPr lang="en-US"/>
+              <a:rPr lang="en-CA"/>
               <a:t>February 2024</a:t>
             </a:r>
-            <a:endParaRPr lang="en-CA"/>
           </a:p>
         </p:txBody>
       </p:sp>
@@ -9256,7 +10076,7 @@
           <p:cNvPr id="4" name="Footer Placeholder 3">
             <a:extLst>
               <a:ext uri="{FF2B5EF4-FFF2-40B4-BE49-F238E27FC236}">
-                <a16:creationId xmlns:a16="http://schemas.microsoft.com/office/drawing/2014/main" id="{F3E1B216-7C55-364E-B3A1-87FF41AAD3D4}"/>
+                <a16:creationId xmlns:a16="http://schemas.microsoft.com/office/drawing/2014/main" id="{DD624D61-D102-CDDE-6199-35CA1EE55F3A}"/>
               </a:ext>
             </a:extLst>
           </p:cNvPr>
@@ -9274,7 +10094,7 @@
           <a:p>
             <a:r>
               <a:rPr lang="en-US"/>
-              <a:t>Production 1 - Introduction to ML Systems</a:t>
+              <a:t>Production 1: Introduction to ML Systems</a:t>
             </a:r>
             <a:endParaRPr lang="en-CA"/>
           </a:p>
@@ -9285,7 +10105,7 @@
           <p:cNvPr id="5" name="Slide Number Placeholder 4">
             <a:extLst>
               <a:ext uri="{FF2B5EF4-FFF2-40B4-BE49-F238E27FC236}">
-                <a16:creationId xmlns:a16="http://schemas.microsoft.com/office/drawing/2014/main" id="{E4C1797E-3C48-DDB0-1B62-B3FF5C1E8B62}"/>
+                <a16:creationId xmlns:a16="http://schemas.microsoft.com/office/drawing/2014/main" id="{6CD394C0-9028-C292-5E4B-FD5C164E5923}"/>
               </a:ext>
             </a:extLst>
           </p:cNvPr>
@@ -9374,8 +10194,8 @@
         </p:blipFill>
         <p:spPr bwMode="auto">
           <a:xfrm>
-            <a:off x="2844800" y="2006600"/>
-            <a:ext cx="6388100" cy="3759200"/>
+            <a:off x="1810286" y="1226693"/>
+            <a:ext cx="8571428" cy="5042857"/>
           </a:xfrm>
           <a:prstGeom prst="rect">
             <a:avLst/>
@@ -9393,7 +10213,7 @@
           <p:cNvPr id="4" name="Date Placeholder 3">
             <a:extLst>
               <a:ext uri="{FF2B5EF4-FFF2-40B4-BE49-F238E27FC236}">
-                <a16:creationId xmlns:a16="http://schemas.microsoft.com/office/drawing/2014/main" id="{5D1D19DB-98DF-7DCC-EB34-F8B75C708224}"/>
+                <a16:creationId xmlns:a16="http://schemas.microsoft.com/office/drawing/2014/main" id="{FF6F7B61-1D96-F859-9CAC-3FA51B854ADC}"/>
               </a:ext>
             </a:extLst>
           </p:cNvPr>
@@ -9410,10 +10230,9 @@
           <a:lstStyle/>
           <a:p>
             <a:r>
-              <a:rPr lang="en-US"/>
+              <a:rPr lang="en-CA"/>
               <a:t>February 2024</a:t>
             </a:r>
-            <a:endParaRPr lang="en-CA"/>
           </a:p>
         </p:txBody>
       </p:sp>
@@ -9422,7 +10241,7 @@
           <p:cNvPr id="5" name="Footer Placeholder 4">
             <a:extLst>
               <a:ext uri="{FF2B5EF4-FFF2-40B4-BE49-F238E27FC236}">
-                <a16:creationId xmlns:a16="http://schemas.microsoft.com/office/drawing/2014/main" id="{5D929979-74E5-C0E0-26C3-D2EC9590EFD3}"/>
+                <a16:creationId xmlns:a16="http://schemas.microsoft.com/office/drawing/2014/main" id="{513DCF24-D7E7-884D-329B-65EE80C84041}"/>
               </a:ext>
             </a:extLst>
           </p:cNvPr>
@@ -9440,7 +10259,7 @@
           <a:p>
             <a:r>
               <a:rPr lang="en-US"/>
-              <a:t>Production 1 - Introduction to ML Systems</a:t>
+              <a:t>Production 1: Introduction to ML Systems</a:t>
             </a:r>
             <a:endParaRPr lang="en-CA"/>
           </a:p>
@@ -9451,7 +10270,7 @@
           <p:cNvPr id="6" name="Slide Number Placeholder 5">
             <a:extLst>
               <a:ext uri="{FF2B5EF4-FFF2-40B4-BE49-F238E27FC236}">
-                <a16:creationId xmlns:a16="http://schemas.microsoft.com/office/drawing/2014/main" id="{83FE5C40-85D8-425E-4FB1-C83D932848A9}"/>
+                <a16:creationId xmlns:a16="http://schemas.microsoft.com/office/drawing/2014/main" id="{A1F9554A-8F7B-9059-862D-9FB0F85147D5}"/>
               </a:ext>
             </a:extLst>
           </p:cNvPr>
@@ -9510,7 +10329,12 @@
             <p:ph type="title"/>
           </p:nvPr>
         </p:nvSpPr>
-        <p:spPr/>
+        <p:spPr>
+          <a:xfrm>
+            <a:off x="657224" y="493396"/>
+            <a:ext cx="10772775" cy="1512147"/>
+          </a:xfrm>
+        </p:spPr>
         <p:txBody>
           <a:bodyPr/>
           <a:lstStyle/>
@@ -9540,8 +10364,8 @@
         </p:blipFill>
         <p:spPr bwMode="auto">
           <a:xfrm>
-            <a:off x="2844800" y="2006600"/>
-            <a:ext cx="6388100" cy="3759200"/>
+            <a:off x="1608127" y="1278856"/>
+            <a:ext cx="8861446" cy="5214688"/>
           </a:xfrm>
           <a:prstGeom prst="rect">
             <a:avLst/>
@@ -9559,7 +10383,7 @@
           <p:cNvPr id="4" name="Date Placeholder 3">
             <a:extLst>
               <a:ext uri="{FF2B5EF4-FFF2-40B4-BE49-F238E27FC236}">
-                <a16:creationId xmlns:a16="http://schemas.microsoft.com/office/drawing/2014/main" id="{DB4E0825-C6E0-C6AC-30A6-6452E3C1E84B}"/>
+                <a16:creationId xmlns:a16="http://schemas.microsoft.com/office/drawing/2014/main" id="{0018201D-44B4-B585-9209-258F81D8FE34}"/>
               </a:ext>
             </a:extLst>
           </p:cNvPr>
@@ -9576,10 +10400,9 @@
           <a:lstStyle/>
           <a:p>
             <a:r>
-              <a:rPr lang="en-US"/>
+              <a:rPr lang="en-CA"/>
               <a:t>February 2024</a:t>
             </a:r>
-            <a:endParaRPr lang="en-CA"/>
           </a:p>
         </p:txBody>
       </p:sp>
@@ -9588,7 +10411,7 @@
           <p:cNvPr id="5" name="Footer Placeholder 4">
             <a:extLst>
               <a:ext uri="{FF2B5EF4-FFF2-40B4-BE49-F238E27FC236}">
-                <a16:creationId xmlns:a16="http://schemas.microsoft.com/office/drawing/2014/main" id="{883B6D55-9235-C93F-2E20-0D6730A4DA2C}"/>
+                <a16:creationId xmlns:a16="http://schemas.microsoft.com/office/drawing/2014/main" id="{871FC20C-7986-D580-303F-A1516177FCB1}"/>
               </a:ext>
             </a:extLst>
           </p:cNvPr>
@@ -9606,7 +10429,7 @@
           <a:p>
             <a:r>
               <a:rPr lang="en-US"/>
-              <a:t>Production 1 - Introduction to ML Systems</a:t>
+              <a:t>Production 1: Introduction to ML Systems</a:t>
             </a:r>
             <a:endParaRPr lang="en-CA"/>
           </a:p>
@@ -9617,7 +10440,7 @@
           <p:cNvPr id="6" name="Slide Number Placeholder 5">
             <a:extLst>
               <a:ext uri="{FF2B5EF4-FFF2-40B4-BE49-F238E27FC236}">
-                <a16:creationId xmlns:a16="http://schemas.microsoft.com/office/drawing/2014/main" id="{AB8843CA-8AFB-3190-BEA7-5E81071EEBCD}"/>
+                <a16:creationId xmlns:a16="http://schemas.microsoft.com/office/drawing/2014/main" id="{CAD2F754-698C-D1B8-F7EF-0CA0F0AA4C77}"/>
               </a:ext>
             </a:extLst>
           </p:cNvPr>
@@ -9702,6 +10525,90 @@
         </p:nvSpPr>
         <p:spPr/>
         <p:txBody>
+          <a:bodyPr anchor="ctr">
+            <a:normAutofit fontScale="85000" lnSpcReduction="20000"/>
+          </a:bodyPr>
+          <a:lstStyle/>
+          <a:p>
+            <a:pPr marL="0" lvl="0" indent="0">
+              <a:buNone/>
+            </a:pPr>
+            <a:r>
+              <a:rPr dirty="0"/>
+              <a:t>“A computer program is said to learn from experience </a:t>
+            </a:r>
+            <a:r>
+              <a:rPr i="1" dirty="0"/>
+              <a:t>E</a:t>
+            </a:r>
+            <a:r>
+              <a:rPr dirty="0"/>
+              <a:t> with respect to some class of tasks </a:t>
+            </a:r>
+            <a:r>
+              <a:rPr i="1" dirty="0"/>
+              <a:t>T</a:t>
+            </a:r>
+            <a:r>
+              <a:rPr dirty="0"/>
+              <a:t> and performance measure </a:t>
+            </a:r>
+            <a:r>
+              <a:rPr i="1" dirty="0"/>
+              <a:t>P</a:t>
+            </a:r>
+            <a:r>
+              <a:rPr dirty="0"/>
+              <a:t>, if its performance at tasks in </a:t>
+            </a:r>
+            <a:r>
+              <a:rPr i="1" dirty="0"/>
+              <a:t>T</a:t>
+            </a:r>
+            <a:r>
+              <a:rPr dirty="0"/>
+              <a:t>, as measured by </a:t>
+            </a:r>
+            <a:r>
+              <a:rPr i="1" dirty="0"/>
+              <a:t>P</a:t>
+            </a:r>
+            <a:r>
+              <a:rPr dirty="0"/>
+              <a:t>, improves with experience </a:t>
+            </a:r>
+            <a:r>
+              <a:rPr i="1" dirty="0"/>
+              <a:t>E</a:t>
+            </a:r>
+            <a:r>
+              <a:rPr dirty="0"/>
+              <a:t>.”</a:t>
+            </a:r>
+          </a:p>
+          <a:p>
+            <a:pPr marL="0" lvl="0" indent="0" algn="r">
+              <a:buNone/>
+            </a:pPr>
+            <a:r>
+              <a:rPr sz="1300" dirty="0"/>
+              <a:t>(Mitchel, 1997)</a:t>
+            </a:r>
+          </a:p>
+        </p:txBody>
+      </p:sp>
+      <p:sp>
+        <p:nvSpPr>
+          <p:cNvPr id="4" name="Content Placeholder 3"/>
+          <p:cNvSpPr>
+            <a:spLocks noGrp="1"/>
+          </p:cNvSpPr>
+          <p:nvPr>
+            <p:ph sz="half" idx="2"/>
+          </p:nvPr>
+        </p:nvSpPr>
+        <p:spPr/>
+        <p:txBody>
           <a:bodyPr>
             <a:normAutofit fontScale="85000" lnSpcReduction="20000"/>
           </a:bodyPr>
@@ -9711,112 +10618,40 @@
               <a:buNone/>
             </a:pPr>
             <a:r>
-              <a:t>“A computer program is said to learn from experience </a:t>
-            </a:r>
-            <a:r>
-              <a:rPr i="1"/>
-              <a:t>E</a:t>
-            </a:r>
-            <a:r>
-              <a:t> with respect to some class of tasks </a:t>
-            </a:r>
-            <a:r>
-              <a:rPr i="1"/>
-              <a:t>T</a:t>
-            </a:r>
-            <a:r>
-              <a:t> and performance measure </a:t>
-            </a:r>
-            <a:r>
-              <a:rPr i="1"/>
-              <a:t>P</a:t>
-            </a:r>
-            <a:r>
-              <a:t>, if its performance at tasks in </a:t>
-            </a:r>
-            <a:r>
-              <a:rPr i="1"/>
-              <a:t>T</a:t>
-            </a:r>
-            <a:r>
-              <a:t>, as measured by </a:t>
-            </a:r>
-            <a:r>
-              <a:rPr i="1"/>
-              <a:t>P</a:t>
-            </a:r>
-            <a:r>
-              <a:t>, improves with experience </a:t>
-            </a:r>
-            <a:r>
-              <a:rPr i="1"/>
-              <a:t>E</a:t>
-            </a:r>
-            <a:r>
-              <a:t>.”</a:t>
-            </a:r>
-          </a:p>
-          <a:p>
-            <a:pPr marL="0" lvl="0" indent="0">
-              <a:buNone/>
-            </a:pPr>
-            <a:r>
-              <a:t>(Mitchel, 1997)</a:t>
-            </a:r>
-          </a:p>
-        </p:txBody>
-      </p:sp>
-      <p:sp>
-        <p:nvSpPr>
-          <p:cNvPr id="4" name="Content Placeholder 3"/>
-          <p:cNvSpPr>
-            <a:spLocks noGrp="1"/>
-          </p:cNvSpPr>
-          <p:nvPr>
-            <p:ph sz="half" idx="2"/>
-          </p:nvPr>
-        </p:nvSpPr>
-        <p:spPr/>
-        <p:txBody>
-          <a:bodyPr>
-            <a:normAutofit fontScale="85000" lnSpcReduction="20000"/>
-          </a:bodyPr>
-          <a:lstStyle/>
-          <a:p>
-            <a:pPr marL="0" lvl="0" indent="0">
-              <a:buNone/>
-            </a:pPr>
-            <a:r>
+              <a:rPr dirty="0"/>
               <a:t>ML is a collection of methods that allow a computer to:</a:t>
             </a:r>
           </a:p>
           <a:p>
             <a:pPr lvl="0"/>
             <a:r>
-              <a:rPr b="1"/>
+              <a:rPr b="1" dirty="0"/>
               <a:t>Learn autonomously</a:t>
             </a:r>
             <a:r>
+              <a:rPr dirty="0"/>
               <a:t> to perform a task based on a set of examples and without being explicitly programmed to perform the task.</a:t>
             </a:r>
           </a:p>
           <a:p>
             <a:pPr lvl="0"/>
             <a:r>
-              <a:rPr b="1"/>
+              <a:rPr b="1" dirty="0"/>
               <a:t>Gain from experience</a:t>
             </a:r>
             <a:r>
+              <a:rPr dirty="0"/>
               <a:t> such that the method performs better in the measure that it observes additional examples.</a:t>
             </a:r>
           </a:p>
           <a:p>
             <a:pPr lvl="0"/>
             <a:r>
-              <a:rPr b="1"/>
+              <a:rPr b="1" dirty="0"/>
               <a:t>Generalize results</a:t>
             </a:r>
             <a:r>
+              <a:rPr dirty="0"/>
               <a:t> beyond the data used for training the method.</a:t>
             </a:r>
           </a:p>
@@ -9827,7 +10662,7 @@
           <p:cNvPr id="5" name="Date Placeholder 4">
             <a:extLst>
               <a:ext uri="{FF2B5EF4-FFF2-40B4-BE49-F238E27FC236}">
-                <a16:creationId xmlns:a16="http://schemas.microsoft.com/office/drawing/2014/main" id="{843C1D2F-0849-9242-4416-9D9EBA48AF99}"/>
+                <a16:creationId xmlns:a16="http://schemas.microsoft.com/office/drawing/2014/main" id="{E1BFFC3A-E51E-334A-F4AB-616E0C987356}"/>
               </a:ext>
             </a:extLst>
           </p:cNvPr>
@@ -9844,10 +10679,9 @@
           <a:lstStyle/>
           <a:p>
             <a:r>
-              <a:rPr lang="en-US"/>
+              <a:rPr lang="en-CA"/>
               <a:t>February 2024</a:t>
             </a:r>
-            <a:endParaRPr lang="en-CA"/>
           </a:p>
         </p:txBody>
       </p:sp>
@@ -9856,7 +10690,7 @@
           <p:cNvPr id="6" name="Footer Placeholder 5">
             <a:extLst>
               <a:ext uri="{FF2B5EF4-FFF2-40B4-BE49-F238E27FC236}">
-                <a16:creationId xmlns:a16="http://schemas.microsoft.com/office/drawing/2014/main" id="{F81AF9FF-9845-68EF-FC81-F96417E4775D}"/>
+                <a16:creationId xmlns:a16="http://schemas.microsoft.com/office/drawing/2014/main" id="{AE2C9DF6-9B3F-0F9F-E18D-140B9C11C202}"/>
               </a:ext>
             </a:extLst>
           </p:cNvPr>
@@ -9874,7 +10708,7 @@
           <a:p>
             <a:r>
               <a:rPr lang="en-US"/>
-              <a:t>Production 1 - Introduction to ML Systems</a:t>
+              <a:t>Production 1: Introduction to ML Systems</a:t>
             </a:r>
             <a:endParaRPr lang="en-CA"/>
           </a:p>
@@ -9885,7 +10719,7 @@
           <p:cNvPr id="7" name="Slide Number Placeholder 6">
             <a:extLst>
               <a:ext uri="{FF2B5EF4-FFF2-40B4-BE49-F238E27FC236}">
-                <a16:creationId xmlns:a16="http://schemas.microsoft.com/office/drawing/2014/main" id="{6856DBD9-4C7A-A59F-E311-3D6A9A48A412}"/>
+                <a16:creationId xmlns:a16="http://schemas.microsoft.com/office/drawing/2014/main" id="{FA080BF6-4120-798F-52A6-1A3149DFD4B4}"/>
               </a:ext>
             </a:extLst>
           </p:cNvPr>
@@ -10022,8 +10856,8 @@
         </p:blipFill>
         <p:spPr bwMode="auto">
           <a:xfrm>
-            <a:off x="6007100" y="2565400"/>
-            <a:ext cx="4660900" cy="2616200"/>
+            <a:off x="5364770" y="1942026"/>
+            <a:ext cx="5933286" cy="3330400"/>
           </a:xfrm>
           <a:prstGeom prst="rect">
             <a:avLst/>
@@ -10038,10 +10872,48 @@
       </p:pic>
       <p:sp>
         <p:nvSpPr>
-          <p:cNvPr id="5" name="Date Placeholder 4">
+          <p:cNvPr id="5" name="TextBox 3"/>
+          <p:cNvSpPr txBox="1"/>
+          <p:nvPr/>
+        </p:nvSpPr>
+        <p:spPr>
+          <a:xfrm>
+            <a:off x="6007100" y="5245100"/>
+            <a:ext cx="4660900" cy="508000"/>
+          </a:xfrm>
+          <a:prstGeom prst="rect">
+            <a:avLst/>
+          </a:prstGeom>
+          <a:noFill/>
+        </p:spPr>
+        <p:txBody>
+          <a:bodyPr/>
+          <a:lstStyle/>
+          <a:p>
+            <a:pPr marL="0" lvl="0" indent="0" algn="ctr">
+              <a:buNone/>
+            </a:pPr>
+            <a:r>
+              <a:t>(</a:t>
+            </a:r>
+            <a:r>
+              <a:rPr>
+                <a:hlinkClick r:id="rId3"/>
+              </a:rPr>
+              <a:t>Source</a:t>
+            </a:r>
+            <a:r>
+              <a:t>)</a:t>
+            </a:r>
+          </a:p>
+        </p:txBody>
+      </p:sp>
+      <p:sp>
+        <p:nvSpPr>
+          <p:cNvPr id="6" name="Date Placeholder 5">
             <a:extLst>
               <a:ext uri="{FF2B5EF4-FFF2-40B4-BE49-F238E27FC236}">
-                <a16:creationId xmlns:a16="http://schemas.microsoft.com/office/drawing/2014/main" id="{163A1ADF-A2AC-30F2-2D0C-17C596FD85D3}"/>
+                <a16:creationId xmlns:a16="http://schemas.microsoft.com/office/drawing/2014/main" id="{9E2AB3BE-C8B1-52DC-FF74-DA76BF4AFD43}"/>
               </a:ext>
             </a:extLst>
           </p:cNvPr>
@@ -10058,19 +10930,18 @@
           <a:lstStyle/>
           <a:p>
             <a:r>
-              <a:rPr lang="en-US"/>
+              <a:rPr lang="en-CA"/>
               <a:t>February 2024</a:t>
             </a:r>
-            <a:endParaRPr lang="en-CA"/>
-          </a:p>
-        </p:txBody>
-      </p:sp>
-      <p:sp>
-        <p:nvSpPr>
-          <p:cNvPr id="6" name="Footer Placeholder 5">
+          </a:p>
+        </p:txBody>
+      </p:sp>
+      <p:sp>
+        <p:nvSpPr>
+          <p:cNvPr id="7" name="Footer Placeholder 6">
             <a:extLst>
               <a:ext uri="{FF2B5EF4-FFF2-40B4-BE49-F238E27FC236}">
-                <a16:creationId xmlns:a16="http://schemas.microsoft.com/office/drawing/2014/main" id="{1948D803-6CEE-3F07-8672-32487FE72260}"/>
+                <a16:creationId xmlns:a16="http://schemas.microsoft.com/office/drawing/2014/main" id="{4AF6451C-3312-E3B0-9259-524666697D41}"/>
               </a:ext>
             </a:extLst>
           </p:cNvPr>
@@ -10088,7 +10959,7 @@
           <a:p>
             <a:r>
               <a:rPr lang="en-US"/>
-              <a:t>Production 1 - Introduction to ML Systems</a:t>
+              <a:t>Production 1: Introduction to ML Systems</a:t>
             </a:r>
             <a:endParaRPr lang="en-CA"/>
           </a:p>
@@ -10096,10 +10967,10 @@
       </p:sp>
       <p:sp>
         <p:nvSpPr>
-          <p:cNvPr id="7" name="Slide Number Placeholder 6">
+          <p:cNvPr id="8" name="Slide Number Placeholder 7">
             <a:extLst>
               <a:ext uri="{FF2B5EF4-FFF2-40B4-BE49-F238E27FC236}">
-                <a16:creationId xmlns:a16="http://schemas.microsoft.com/office/drawing/2014/main" id="{F4FD3566-F24C-7F75-FAB3-45B80906EF09}"/>
+                <a16:creationId xmlns:a16="http://schemas.microsoft.com/office/drawing/2014/main" id="{00CDC061-F157-EB7E-C3B1-0CC9D0DCB3B5}"/>
               </a:ext>
             </a:extLst>
           </p:cNvPr>

</xml_diff>